<commit_message>
Edits on Sections 1-3.
</commit_message>
<xml_diff>
--- a/figs_src/diagrams.pptx
+++ b/figs_src/diagrams.pptx
@@ -194,7 +194,7 @@
           <a:p>
             <a:fld id="{843567C3-09B7-4EC5-8695-9659B6A4537F}" type="datetimeFigureOut">
               <a:rPr lang="en-US" smtClean="0"/>
-              <a:t>5/22/2014</a:t>
+              <a:t>5/23/2014</a:t>
             </a:fld>
             <a:endParaRPr lang="en-US"/>
           </a:p>
@@ -644,7 +644,7 @@
             <a:fld id="{1D8BD707-D9CF-40AE-B4C6-C98DA3205C09}" type="datetimeFigureOut">
               <a:rPr lang="en-US" smtClean="0"/>
               <a:pPr/>
-              <a:t>5/22/2014</a:t>
+              <a:t>5/23/2014</a:t>
             </a:fld>
             <a:endParaRPr lang="en-US"/>
           </a:p>
@@ -811,7 +811,7 @@
             <a:fld id="{1D8BD707-D9CF-40AE-B4C6-C98DA3205C09}" type="datetimeFigureOut">
               <a:rPr lang="en-US" smtClean="0"/>
               <a:pPr/>
-              <a:t>5/22/2014</a:t>
+              <a:t>5/23/2014</a:t>
             </a:fld>
             <a:endParaRPr lang="en-US"/>
           </a:p>
@@ -988,7 +988,7 @@
             <a:fld id="{1D8BD707-D9CF-40AE-B4C6-C98DA3205C09}" type="datetimeFigureOut">
               <a:rPr lang="en-US" smtClean="0"/>
               <a:pPr/>
-              <a:t>5/22/2014</a:t>
+              <a:t>5/23/2014</a:t>
             </a:fld>
             <a:endParaRPr lang="en-US"/>
           </a:p>
@@ -1155,7 +1155,7 @@
             <a:fld id="{1D8BD707-D9CF-40AE-B4C6-C98DA3205C09}" type="datetimeFigureOut">
               <a:rPr lang="en-US" smtClean="0"/>
               <a:pPr/>
-              <a:t>5/22/2014</a:t>
+              <a:t>5/23/2014</a:t>
             </a:fld>
             <a:endParaRPr lang="en-US"/>
           </a:p>
@@ -1398,7 +1398,7 @@
             <a:fld id="{1D8BD707-D9CF-40AE-B4C6-C98DA3205C09}" type="datetimeFigureOut">
               <a:rPr lang="en-US" smtClean="0"/>
               <a:pPr/>
-              <a:t>5/22/2014</a:t>
+              <a:t>5/23/2014</a:t>
             </a:fld>
             <a:endParaRPr lang="en-US"/>
           </a:p>
@@ -1683,7 +1683,7 @@
             <a:fld id="{1D8BD707-D9CF-40AE-B4C6-C98DA3205C09}" type="datetimeFigureOut">
               <a:rPr lang="en-US" smtClean="0"/>
               <a:pPr/>
-              <a:t>5/22/2014</a:t>
+              <a:t>5/23/2014</a:t>
             </a:fld>
             <a:endParaRPr lang="en-US"/>
           </a:p>
@@ -2102,7 +2102,7 @@
             <a:fld id="{1D8BD707-D9CF-40AE-B4C6-C98DA3205C09}" type="datetimeFigureOut">
               <a:rPr lang="en-US" smtClean="0"/>
               <a:pPr/>
-              <a:t>5/22/2014</a:t>
+              <a:t>5/23/2014</a:t>
             </a:fld>
             <a:endParaRPr lang="en-US"/>
           </a:p>
@@ -2217,7 +2217,7 @@
             <a:fld id="{1D8BD707-D9CF-40AE-B4C6-C98DA3205C09}" type="datetimeFigureOut">
               <a:rPr lang="en-US" smtClean="0"/>
               <a:pPr/>
-              <a:t>5/22/2014</a:t>
+              <a:t>5/23/2014</a:t>
             </a:fld>
             <a:endParaRPr lang="en-US"/>
           </a:p>
@@ -2309,7 +2309,7 @@
             <a:fld id="{1D8BD707-D9CF-40AE-B4C6-C98DA3205C09}" type="datetimeFigureOut">
               <a:rPr lang="en-US" smtClean="0"/>
               <a:pPr/>
-              <a:t>5/22/2014</a:t>
+              <a:t>5/23/2014</a:t>
             </a:fld>
             <a:endParaRPr lang="en-US"/>
           </a:p>
@@ -2583,7 +2583,7 @@
             <a:fld id="{1D8BD707-D9CF-40AE-B4C6-C98DA3205C09}" type="datetimeFigureOut">
               <a:rPr lang="en-US" smtClean="0"/>
               <a:pPr/>
-              <a:t>5/22/2014</a:t>
+              <a:t>5/23/2014</a:t>
             </a:fld>
             <a:endParaRPr lang="en-US"/>
           </a:p>
@@ -2833,7 +2833,7 @@
             <a:fld id="{1D8BD707-D9CF-40AE-B4C6-C98DA3205C09}" type="datetimeFigureOut">
               <a:rPr lang="en-US" smtClean="0"/>
               <a:pPr/>
-              <a:t>5/22/2014</a:t>
+              <a:t>5/23/2014</a:t>
             </a:fld>
             <a:endParaRPr lang="en-US"/>
           </a:p>
@@ -3043,7 +3043,7 @@
             <a:fld id="{1D8BD707-D9CF-40AE-B4C6-C98DA3205C09}" type="datetimeFigureOut">
               <a:rPr lang="en-US" smtClean="0"/>
               <a:pPr/>
-              <a:t>5/22/2014</a:t>
+              <a:t>5/23/2014</a:t>
             </a:fld>
             <a:endParaRPr lang="en-US"/>
           </a:p>
@@ -3523,14 +3523,14 @@
           <a:p>
             <a:pPr algn="ctr"/>
             <a:r>
-              <a:rPr lang="en-US" sz="900" dirty="0" smtClean="0">
+              <a:rPr lang="en-US" sz="900" smtClean="0">
                 <a:solidFill>
                   <a:schemeClr val="tx1"/>
                 </a:solidFill>
                 <a:latin typeface="Times New Roman" pitchFamily="18" charset="0"/>
                 <a:cs typeface="Times New Roman" pitchFamily="18" charset="0"/>
               </a:rPr>
-              <a:t>Monitor</a:t>
+              <a:t>MonitoringCore</a:t>
             </a:r>
             <a:endParaRPr lang="en-US" sz="900" dirty="0">
               <a:solidFill>
@@ -5150,13 +5150,6 @@
               </a:rPr>
               <a:t>D</a:t>
             </a:r>
-            <a:endParaRPr lang="en-US" sz="900" dirty="0">
-              <a:solidFill>
-                <a:schemeClr val="tx1"/>
-              </a:solidFill>
-              <a:latin typeface="Times New Roman" pitchFamily="18" charset="0"/>
-              <a:cs typeface="Times New Roman" pitchFamily="18" charset="0"/>
-            </a:endParaRPr>
           </a:p>
         </p:txBody>
       </p:sp>
@@ -5251,13 +5244,6 @@
               </a:rPr>
               <a:t>E</a:t>
             </a:r>
-            <a:endParaRPr lang="en-US" sz="900" dirty="0">
-              <a:solidFill>
-                <a:schemeClr val="tx1"/>
-              </a:solidFill>
-              <a:latin typeface="Times New Roman" pitchFamily="18" charset="0"/>
-              <a:cs typeface="Times New Roman" pitchFamily="18" charset="0"/>
-            </a:endParaRPr>
           </a:p>
         </p:txBody>
       </p:sp>
@@ -5352,13 +5338,6 @@
               </a:rPr>
               <a:t>F</a:t>
             </a:r>
-            <a:endParaRPr lang="en-US" sz="900" dirty="0">
-              <a:solidFill>
-                <a:schemeClr val="tx1"/>
-              </a:solidFill>
-              <a:latin typeface="Times New Roman" pitchFamily="18" charset="0"/>
-              <a:cs typeface="Times New Roman" pitchFamily="18" charset="0"/>
-            </a:endParaRPr>
           </a:p>
         </p:txBody>
       </p:sp>
@@ -5456,13 +5435,6 @@
               </a:rPr>
               <a:t>G</a:t>
             </a:r>
-            <a:endParaRPr lang="en-US" sz="900" dirty="0">
-              <a:solidFill>
-                <a:schemeClr val="tx1"/>
-              </a:solidFill>
-              <a:latin typeface="Times New Roman" pitchFamily="18" charset="0"/>
-              <a:cs typeface="Times New Roman" pitchFamily="18" charset="0"/>
-            </a:endParaRPr>
           </a:p>
         </p:txBody>
       </p:sp>

</xml_diff>

<commit_message>
Add figure for policy trade off.
</commit_message>
<xml_diff>
--- a/figs_src/diagrams.pptx
+++ b/figs_src/diagrams.pptx
@@ -5,7 +5,7 @@
     <p:sldMasterId id="2147483648" r:id="rId1"/>
   </p:sldMasterIdLst>
   <p:notesMasterIdLst>
-    <p:notesMasterId r:id="rId17"/>
+    <p:notesMasterId r:id="rId18"/>
   </p:notesMasterIdLst>
   <p:sldIdLst>
     <p:sldId id="256" r:id="rId2"/>
@@ -23,6 +23,7 @@
     <p:sldId id="260" r:id="rId14"/>
     <p:sldId id="265" r:id="rId15"/>
     <p:sldId id="268" r:id="rId16"/>
+    <p:sldId id="271" r:id="rId17"/>
   </p:sldIdLst>
   <p:sldSz cx="3200400" cy="7772400"/>
   <p:notesSz cx="2743200" cy="7315200"/>
@@ -7894,27 +7895,63 @@
           <a:chExt cx="0" cy="0"/>
         </a:xfrm>
       </p:grpSpPr>
-      <p:sp>
-        <p:nvSpPr>
-          <p:cNvPr id="17" name="Rectangle 16"/>
+      <p:cxnSp>
+        <p:nvCxnSpPr>
+          <p:cNvPr id="59" name="Straight Arrow Connector 58"/>
+          <p:cNvCxnSpPr>
+            <a:stCxn id="26" idx="2"/>
+            <a:endCxn id="25" idx="0"/>
+          </p:cNvCxnSpPr>
+          <p:nvPr/>
+        </p:nvCxnSpPr>
+        <p:spPr>
+          <a:xfrm flipH="1">
+            <a:off x="1050456" y="315226"/>
+            <a:ext cx="1" cy="272818"/>
+          </a:xfrm>
+          <a:prstGeom prst="straightConnector1">
+            <a:avLst/>
+          </a:prstGeom>
+          <a:ln w="19050">
+            <a:solidFill>
+              <a:schemeClr val="tx1"/>
+            </a:solidFill>
+            <a:headEnd w="sm" len="sm"/>
+            <a:tailEnd type="arrow" w="sm" len="sm"/>
+          </a:ln>
+        </p:spPr>
+        <p:style>
+          <a:lnRef idx="1">
+            <a:schemeClr val="accent1"/>
+          </a:lnRef>
+          <a:fillRef idx="0">
+            <a:schemeClr val="accent1"/>
+          </a:fillRef>
+          <a:effectRef idx="0">
+            <a:schemeClr val="accent1"/>
+          </a:effectRef>
+          <a:fontRef idx="minor">
+            <a:schemeClr val="tx1"/>
+          </a:fontRef>
+        </p:style>
+      </p:cxnSp>
+      <p:sp>
+        <p:nvSpPr>
+          <p:cNvPr id="24" name="Rectangle 23"/>
           <p:cNvSpPr/>
           <p:nvPr/>
         </p:nvSpPr>
         <p:spPr>
           <a:xfrm>
-            <a:off x="25595" y="53775"/>
-            <a:ext cx="566328" cy="259674"/>
+            <a:off x="971462" y="315226"/>
+            <a:ext cx="436713" cy="211786"/>
           </a:xfrm>
           <a:prstGeom prst="rect">
             <a:avLst/>
           </a:prstGeom>
-          <a:solidFill>
-            <a:srgbClr val="FFFFCC"/>
-          </a:solidFill>
+          <a:noFill/>
           <a:ln w="12700">
-            <a:solidFill>
-              <a:schemeClr val="tx1"/>
-            </a:solidFill>
+            <a:noFill/>
           </a:ln>
         </p:spPr>
         <p:style>
@@ -7946,21 +7983,28 @@
                 <a:latin typeface="Times New Roman" pitchFamily="18" charset="0"/>
                 <a:cs typeface="Times New Roman" pitchFamily="18" charset="0"/>
               </a:rPr>
-              <a:t>FIFO</a:t>
-            </a:r>
-          </a:p>
-        </p:txBody>
-      </p:sp>
-      <p:sp>
-        <p:nvSpPr>
-          <p:cNvPr id="21" name="Rectangle 20"/>
+              <a:t>yes</a:t>
+            </a:r>
+            <a:endParaRPr lang="en-US" sz="900" dirty="0" smtClean="0">
+              <a:solidFill>
+                <a:schemeClr val="tx1"/>
+              </a:solidFill>
+              <a:latin typeface="Times New Roman" pitchFamily="18" charset="0"/>
+              <a:cs typeface="Times New Roman" pitchFamily="18" charset="0"/>
+            </a:endParaRPr>
+          </a:p>
+        </p:txBody>
+      </p:sp>
+      <p:sp>
+        <p:nvSpPr>
+          <p:cNvPr id="25" name="Rectangle 24"/>
           <p:cNvSpPr/>
           <p:nvPr/>
         </p:nvSpPr>
         <p:spPr>
           <a:xfrm>
-            <a:off x="25594" y="516140"/>
-            <a:ext cx="566328" cy="307240"/>
+            <a:off x="563264" y="588044"/>
+            <a:ext cx="974383" cy="264797"/>
           </a:xfrm>
           <a:prstGeom prst="rect">
             <a:avLst/>
@@ -7995,16 +8039,6 @@
           <a:lstStyle/>
           <a:p>
             <a:pPr algn="ctr"/>
-            <a:r>
-              <a:rPr lang="en-US" sz="900" dirty="0" err="1" smtClean="0">
-                <a:solidFill>
-                  <a:schemeClr val="tx1"/>
-                </a:solidFill>
-                <a:latin typeface="Times New Roman" pitchFamily="18" charset="0"/>
-                <a:cs typeface="Times New Roman" pitchFamily="18" charset="0"/>
-              </a:rPr>
-              <a:t>Config</a:t>
-            </a:r>
             <a:r>
               <a:rPr lang="en-US" sz="900" dirty="0" smtClean="0">
                 <a:solidFill>
@@ -8013,68 +8047,39 @@
                 <a:latin typeface="Times New Roman" pitchFamily="18" charset="0"/>
                 <a:cs typeface="Times New Roman" pitchFamily="18" charset="0"/>
               </a:rPr>
-              <a:t> Table</a:t>
-            </a:r>
-          </a:p>
-        </p:txBody>
-      </p:sp>
-      <p:cxnSp>
-        <p:nvCxnSpPr>
-          <p:cNvPr id="22" name="Straight Arrow Connector 21"/>
-          <p:cNvCxnSpPr>
-            <a:stCxn id="17" idx="2"/>
-            <a:endCxn id="21" idx="0"/>
-          </p:cNvCxnSpPr>
-          <p:nvPr/>
-        </p:nvCxnSpPr>
-        <p:spPr>
-          <a:xfrm flipH="1">
-            <a:off x="308758" y="313449"/>
-            <a:ext cx="1" cy="202691"/>
-          </a:xfrm>
-          <a:prstGeom prst="straightConnector1">
-            <a:avLst/>
-          </a:prstGeom>
-          <a:ln w="19050">
-            <a:solidFill>
-              <a:schemeClr val="tx1"/>
-            </a:solidFill>
-            <a:headEnd w="sm" len="sm"/>
-            <a:tailEnd type="arrow" w="sm" len="sm"/>
-          </a:ln>
-        </p:spPr>
-        <p:style>
-          <a:lnRef idx="1">
-            <a:schemeClr val="accent1"/>
-          </a:lnRef>
-          <a:fillRef idx="0">
-            <a:schemeClr val="accent1"/>
-          </a:fillRef>
-          <a:effectRef idx="0">
-            <a:schemeClr val="accent1"/>
-          </a:effectRef>
-          <a:fontRef idx="minor">
-            <a:schemeClr val="tx1"/>
-          </a:fontRef>
-        </p:style>
-      </p:cxnSp>
-      <p:sp>
-        <p:nvSpPr>
-          <p:cNvPr id="27" name="Rectangle 26"/>
+              <a:t>droppable event?</a:t>
+            </a:r>
+            <a:endParaRPr lang="en-US" sz="900" dirty="0" smtClean="0">
+              <a:solidFill>
+                <a:schemeClr val="tx1"/>
+              </a:solidFill>
+              <a:latin typeface="Times New Roman" pitchFamily="18" charset="0"/>
+              <a:cs typeface="Times New Roman" pitchFamily="18" charset="0"/>
+            </a:endParaRPr>
+          </a:p>
+        </p:txBody>
+      </p:sp>
+      <p:sp>
+        <p:nvSpPr>
+          <p:cNvPr id="26" name="Rectangle 25"/>
           <p:cNvSpPr/>
           <p:nvPr/>
         </p:nvSpPr>
         <p:spPr>
           <a:xfrm>
-            <a:off x="219688" y="294774"/>
-            <a:ext cx="689222" cy="211786"/>
+            <a:off x="563265" y="50428"/>
+            <a:ext cx="974383" cy="264798"/>
           </a:xfrm>
           <a:prstGeom prst="rect">
             <a:avLst/>
           </a:prstGeom>
-          <a:noFill/>
+          <a:solidFill>
+            <a:srgbClr val="FFFFCC"/>
+          </a:solidFill>
           <a:ln w="12700">
-            <a:noFill/>
+            <a:solidFill>
+              <a:schemeClr val="tx1"/>
+            </a:solidFill>
           </a:ln>
         </p:spPr>
         <p:style>
@@ -8098,16 +8103,6 @@
           <a:lstStyle/>
           <a:p>
             <a:pPr algn="ctr"/>
-            <a:r>
-              <a:rPr lang="en-US" sz="900" dirty="0" err="1" smtClean="0">
-                <a:solidFill>
-                  <a:schemeClr val="tx1"/>
-                </a:solidFill>
-                <a:latin typeface="Times New Roman" pitchFamily="18" charset="0"/>
-                <a:cs typeface="Times New Roman" pitchFamily="18" charset="0"/>
-              </a:rPr>
-              <a:t>inst</a:t>
-            </a:r>
             <a:r>
               <a:rPr lang="en-US" sz="900" dirty="0" smtClean="0">
                 <a:solidFill>
@@ -8116,32 +8111,35 @@
                 <a:latin typeface="Times New Roman" pitchFamily="18" charset="0"/>
                 <a:cs typeface="Times New Roman" pitchFamily="18" charset="0"/>
               </a:rPr>
-              <a:t> type</a:t>
-            </a:r>
-          </a:p>
-        </p:txBody>
-      </p:sp>
-      <p:sp>
-        <p:nvSpPr>
-          <p:cNvPr id="28" name="Rectangle 27"/>
+              <a:t>slack &lt; 0</a:t>
+            </a:r>
+            <a:endParaRPr lang="en-US" sz="900" dirty="0" smtClean="0">
+              <a:solidFill>
+                <a:schemeClr val="tx1"/>
+              </a:solidFill>
+              <a:latin typeface="Times New Roman" pitchFamily="18" charset="0"/>
+              <a:cs typeface="Times New Roman" pitchFamily="18" charset="0"/>
+            </a:endParaRPr>
+          </a:p>
+        </p:txBody>
+      </p:sp>
+      <p:sp>
+        <p:nvSpPr>
+          <p:cNvPr id="71" name="Rectangle 70"/>
           <p:cNvSpPr/>
           <p:nvPr/>
         </p:nvSpPr>
         <p:spPr>
           <a:xfrm>
-            <a:off x="908910" y="53775"/>
-            <a:ext cx="691290" cy="529595"/>
+            <a:off x="1555476" y="1121040"/>
+            <a:ext cx="893554" cy="231438"/>
           </a:xfrm>
           <a:prstGeom prst="rect">
             <a:avLst/>
           </a:prstGeom>
-          <a:solidFill>
-            <a:srgbClr val="FFFFCC"/>
-          </a:solidFill>
+          <a:noFill/>
           <a:ln w="12700">
-            <a:solidFill>
-              <a:schemeClr val="tx1"/>
-            </a:solidFill>
+            <a:noFill/>
           </a:ln>
         </p:spPr>
         <p:style>
@@ -8165,6 +8163,16 @@
           <a:lstStyle/>
           <a:p>
             <a:pPr algn="ctr"/>
+            <a:r>
+              <a:rPr lang="en-US" sz="900" dirty="0">
+                <a:solidFill>
+                  <a:schemeClr val="tx1"/>
+                </a:solidFill>
+                <a:latin typeface="Times New Roman" pitchFamily="18" charset="0"/>
+                <a:cs typeface="Times New Roman" pitchFamily="18" charset="0"/>
+              </a:rPr>
+              <a:t>m</a:t>
+            </a:r>
             <a:r>
               <a:rPr lang="en-US" sz="900" dirty="0" smtClean="0">
                 <a:solidFill>
@@ -8173,69 +8181,35 @@
                 <a:latin typeface="Times New Roman" pitchFamily="18" charset="0"/>
                 <a:cs typeface="Times New Roman" pitchFamily="18" charset="0"/>
               </a:rPr>
-              <a:t>Address Generation Unit</a:t>
-            </a:r>
-          </a:p>
-        </p:txBody>
-      </p:sp>
-      <p:cxnSp>
-        <p:nvCxnSpPr>
-          <p:cNvPr id="34" name="Straight Arrow Connector 33"/>
-          <p:cNvCxnSpPr/>
-          <p:nvPr/>
-        </p:nvCxnSpPr>
-        <p:spPr>
-          <a:xfrm>
-            <a:off x="591923" y="124002"/>
-            <a:ext cx="316987" cy="0"/>
-          </a:xfrm>
-          <a:prstGeom prst="straightConnector1">
-            <a:avLst/>
-          </a:prstGeom>
-          <a:ln w="19050">
-            <a:solidFill>
-              <a:schemeClr val="tx1"/>
-            </a:solidFill>
-            <a:headEnd w="sm" len="sm"/>
-            <a:tailEnd type="arrow" w="sm" len="sm"/>
-          </a:ln>
-        </p:spPr>
-        <p:style>
-          <a:lnRef idx="1">
-            <a:schemeClr val="accent1"/>
-          </a:lnRef>
-          <a:fillRef idx="0">
-            <a:schemeClr val="accent1"/>
-          </a:fillRef>
-          <a:effectRef idx="0">
-            <a:schemeClr val="accent1"/>
-          </a:effectRef>
-          <a:fontRef idx="minor">
-            <a:schemeClr val="tx1"/>
-          </a:fontRef>
-        </p:style>
-      </p:cxnSp>
-      <p:sp>
-        <p:nvSpPr>
-          <p:cNvPr id="31" name="Rectangle 30"/>
+              <a:t>onitor events</a:t>
+            </a:r>
+            <a:endParaRPr lang="en-US" sz="900" dirty="0" smtClean="0">
+              <a:solidFill>
+                <a:schemeClr val="tx1"/>
+              </a:solidFill>
+              <a:latin typeface="Times New Roman" pitchFamily="18" charset="0"/>
+              <a:cs typeface="Times New Roman" pitchFamily="18" charset="0"/>
+            </a:endParaRPr>
+          </a:p>
+        </p:txBody>
+      </p:sp>
+      <p:sp>
+        <p:nvSpPr>
+          <p:cNvPr id="72" name="Rectangle 71"/>
           <p:cNvSpPr/>
           <p:nvPr/>
         </p:nvSpPr>
         <p:spPr>
           <a:xfrm>
-            <a:off x="985720" y="130585"/>
-            <a:ext cx="691290" cy="529595"/>
+            <a:off x="706645" y="1121040"/>
+            <a:ext cx="687619" cy="231438"/>
           </a:xfrm>
           <a:prstGeom prst="rect">
             <a:avLst/>
           </a:prstGeom>
-          <a:solidFill>
-            <a:srgbClr val="FFFFCC"/>
-          </a:solidFill>
+          <a:noFill/>
           <a:ln w="12700">
-            <a:solidFill>
-              <a:schemeClr val="tx1"/>
-            </a:solidFill>
+            <a:noFill/>
           </a:ln>
         </p:spPr>
         <p:style>
@@ -8259,6 +8233,16 @@
           <a:lstStyle/>
           <a:p>
             <a:pPr algn="ctr"/>
+            <a:r>
+              <a:rPr lang="en-US" sz="900" dirty="0">
+                <a:solidFill>
+                  <a:schemeClr val="tx1"/>
+                </a:solidFill>
+                <a:latin typeface="Times New Roman" pitchFamily="18" charset="0"/>
+                <a:cs typeface="Times New Roman" pitchFamily="18" charset="0"/>
+              </a:rPr>
+              <a:t>d</a:t>
+            </a:r>
             <a:r>
               <a:rPr lang="en-US" sz="900" dirty="0" smtClean="0">
                 <a:solidFill>
@@ -8267,32 +8251,146 @@
                 <a:latin typeface="Times New Roman" pitchFamily="18" charset="0"/>
                 <a:cs typeface="Times New Roman" pitchFamily="18" charset="0"/>
               </a:rPr>
-              <a:t>Address Generation Unit</a:t>
-            </a:r>
-          </a:p>
-        </p:txBody>
-      </p:sp>
-      <p:sp>
-        <p:nvSpPr>
-          <p:cNvPr id="33" name="Rectangle 32"/>
+              <a:t>rop event</a:t>
+            </a:r>
+            <a:endParaRPr lang="en-US" sz="900" dirty="0" smtClean="0">
+              <a:solidFill>
+                <a:schemeClr val="tx1"/>
+              </a:solidFill>
+              <a:latin typeface="Times New Roman" pitchFamily="18" charset="0"/>
+              <a:cs typeface="Times New Roman" pitchFamily="18" charset="0"/>
+            </a:endParaRPr>
+          </a:p>
+        </p:txBody>
+      </p:sp>
+      <p:cxnSp>
+        <p:nvCxnSpPr>
+          <p:cNvPr id="77" name="Straight Arrow Connector 76"/>
+          <p:cNvCxnSpPr/>
+          <p:nvPr/>
+        </p:nvCxnSpPr>
+        <p:spPr>
+          <a:xfrm>
+            <a:off x="2002253" y="182827"/>
+            <a:ext cx="0" cy="976618"/>
+          </a:xfrm>
+          <a:prstGeom prst="straightConnector1">
+            <a:avLst/>
+          </a:prstGeom>
+          <a:ln w="19050">
+            <a:solidFill>
+              <a:schemeClr val="tx1"/>
+            </a:solidFill>
+            <a:headEnd w="sm" len="sm"/>
+            <a:tailEnd type="arrow" w="sm" len="sm"/>
+          </a:ln>
+        </p:spPr>
+        <p:style>
+          <a:lnRef idx="1">
+            <a:schemeClr val="accent1"/>
+          </a:lnRef>
+          <a:fillRef idx="0">
+            <a:schemeClr val="accent1"/>
+          </a:fillRef>
+          <a:effectRef idx="0">
+            <a:schemeClr val="accent1"/>
+          </a:effectRef>
+          <a:fontRef idx="minor">
+            <a:schemeClr val="tx1"/>
+          </a:fontRef>
+        </p:style>
+      </p:cxnSp>
+      <p:cxnSp>
+        <p:nvCxnSpPr>
+          <p:cNvPr id="78" name="Straight Arrow Connector 77"/>
+          <p:cNvCxnSpPr/>
+          <p:nvPr/>
+        </p:nvCxnSpPr>
+        <p:spPr>
+          <a:xfrm>
+            <a:off x="1542172" y="733174"/>
+            <a:ext cx="464605" cy="0"/>
+          </a:xfrm>
+          <a:prstGeom prst="straightConnector1">
+            <a:avLst/>
+          </a:prstGeom>
+          <a:ln w="19050">
+            <a:solidFill>
+              <a:schemeClr val="tx1"/>
+            </a:solidFill>
+            <a:headEnd w="sm" len="sm"/>
+            <a:tailEnd type="none" w="sm" len="sm"/>
+          </a:ln>
+        </p:spPr>
+        <p:style>
+          <a:lnRef idx="1">
+            <a:schemeClr val="accent1"/>
+          </a:lnRef>
+          <a:fillRef idx="0">
+            <a:schemeClr val="accent1"/>
+          </a:fillRef>
+          <a:effectRef idx="0">
+            <a:schemeClr val="accent1"/>
+          </a:effectRef>
+          <a:fontRef idx="minor">
+            <a:schemeClr val="tx1"/>
+          </a:fontRef>
+        </p:style>
+      </p:cxnSp>
+      <p:cxnSp>
+        <p:nvCxnSpPr>
+          <p:cNvPr id="80" name="Straight Arrow Connector 79"/>
+          <p:cNvCxnSpPr/>
+          <p:nvPr/>
+        </p:nvCxnSpPr>
+        <p:spPr>
+          <a:xfrm>
+            <a:off x="1537648" y="182827"/>
+            <a:ext cx="464605" cy="0"/>
+          </a:xfrm>
+          <a:prstGeom prst="straightConnector1">
+            <a:avLst/>
+          </a:prstGeom>
+          <a:ln w="19050">
+            <a:solidFill>
+              <a:schemeClr val="tx1"/>
+            </a:solidFill>
+            <a:headEnd w="sm" len="sm"/>
+            <a:tailEnd type="none" w="sm" len="sm"/>
+          </a:ln>
+        </p:spPr>
+        <p:style>
+          <a:lnRef idx="1">
+            <a:schemeClr val="accent1"/>
+          </a:lnRef>
+          <a:fillRef idx="0">
+            <a:schemeClr val="accent1"/>
+          </a:fillRef>
+          <a:effectRef idx="0">
+            <a:schemeClr val="accent1"/>
+          </a:effectRef>
+          <a:fontRef idx="minor">
+            <a:schemeClr val="tx1"/>
+          </a:fontRef>
+        </p:style>
+      </p:cxnSp>
+      <p:sp>
+        <p:nvSpPr>
+          <p:cNvPr id="83" name="Rectangle 82"/>
           <p:cNvSpPr/>
           <p:nvPr/>
         </p:nvSpPr>
         <p:spPr>
           <a:xfrm>
-            <a:off x="1061310" y="207395"/>
-            <a:ext cx="691290" cy="529595"/>
+            <a:off x="1460488" y="-8651"/>
+            <a:ext cx="436713" cy="211786"/>
           </a:xfrm>
           <a:prstGeom prst="rect">
             <a:avLst/>
           </a:prstGeom>
-          <a:solidFill>
-            <a:srgbClr val="FFFFCC"/>
-          </a:solidFill>
+          <a:noFill/>
           <a:ln w="12700">
-            <a:solidFill>
-              <a:schemeClr val="tx1"/>
-            </a:solidFill>
+            <a:noFill/>
           </a:ln>
         </p:spPr>
         <p:style>
@@ -8324,217 +8422,35 @@
                 <a:latin typeface="Times New Roman" pitchFamily="18" charset="0"/>
                 <a:cs typeface="Times New Roman" pitchFamily="18" charset="0"/>
               </a:rPr>
-              <a:t>Address Generation Unit</a:t>
-            </a:r>
-          </a:p>
-        </p:txBody>
-      </p:sp>
-      <p:cxnSp>
-        <p:nvCxnSpPr>
-          <p:cNvPr id="40" name="Straight Arrow Connector 39"/>
-          <p:cNvCxnSpPr/>
-          <p:nvPr/>
-        </p:nvCxnSpPr>
-        <p:spPr>
-          <a:xfrm>
-            <a:off x="591923" y="183612"/>
-            <a:ext cx="393797" cy="0"/>
-          </a:xfrm>
-          <a:prstGeom prst="straightConnector1">
-            <a:avLst/>
-          </a:prstGeom>
-          <a:ln w="19050">
-            <a:solidFill>
-              <a:schemeClr val="tx1"/>
-            </a:solidFill>
-            <a:headEnd w="sm" len="sm"/>
-            <a:tailEnd type="arrow" w="sm" len="sm"/>
-          </a:ln>
-        </p:spPr>
-        <p:style>
-          <a:lnRef idx="1">
-            <a:schemeClr val="accent1"/>
-          </a:lnRef>
-          <a:fillRef idx="0">
-            <a:schemeClr val="accent1"/>
-          </a:fillRef>
-          <a:effectRef idx="0">
-            <a:schemeClr val="accent1"/>
-          </a:effectRef>
-          <a:fontRef idx="minor">
-            <a:schemeClr val="tx1"/>
-          </a:fontRef>
-        </p:style>
-      </p:cxnSp>
-      <p:cxnSp>
-        <p:nvCxnSpPr>
-          <p:cNvPr id="41" name="Straight Arrow Connector 40"/>
-          <p:cNvCxnSpPr/>
-          <p:nvPr/>
-        </p:nvCxnSpPr>
-        <p:spPr>
-          <a:xfrm>
-            <a:off x="591922" y="237725"/>
-            <a:ext cx="469388" cy="0"/>
-          </a:xfrm>
-          <a:prstGeom prst="straightConnector1">
-            <a:avLst/>
-          </a:prstGeom>
-          <a:ln w="19050">
-            <a:solidFill>
-              <a:schemeClr val="tx1"/>
-            </a:solidFill>
-            <a:headEnd w="sm" len="sm"/>
-            <a:tailEnd type="arrow" w="sm" len="sm"/>
-          </a:ln>
-        </p:spPr>
-        <p:style>
-          <a:lnRef idx="1">
-            <a:schemeClr val="accent1"/>
-          </a:lnRef>
-          <a:fillRef idx="0">
-            <a:schemeClr val="accent1"/>
-          </a:fillRef>
-          <a:effectRef idx="0">
-            <a:schemeClr val="accent1"/>
-          </a:effectRef>
-          <a:fontRef idx="minor">
-            <a:schemeClr val="tx1"/>
-          </a:fontRef>
-        </p:style>
-      </p:cxnSp>
-      <p:cxnSp>
-        <p:nvCxnSpPr>
-          <p:cNvPr id="43" name="Straight Arrow Connector 42"/>
-          <p:cNvCxnSpPr/>
-          <p:nvPr/>
-        </p:nvCxnSpPr>
-        <p:spPr>
-          <a:xfrm>
-            <a:off x="591922" y="698585"/>
-            <a:ext cx="469388" cy="0"/>
-          </a:xfrm>
-          <a:prstGeom prst="straightConnector1">
-            <a:avLst/>
-          </a:prstGeom>
-          <a:ln w="19050">
-            <a:solidFill>
-              <a:schemeClr val="tx1"/>
-            </a:solidFill>
-            <a:headEnd w="sm" len="sm"/>
-            <a:tailEnd type="arrow" w="sm" len="sm"/>
-          </a:ln>
-        </p:spPr>
-        <p:style>
-          <a:lnRef idx="1">
-            <a:schemeClr val="accent1"/>
-          </a:lnRef>
-          <a:fillRef idx="0">
-            <a:schemeClr val="accent1"/>
-          </a:fillRef>
-          <a:effectRef idx="0">
-            <a:schemeClr val="accent1"/>
-          </a:effectRef>
-          <a:fontRef idx="minor">
-            <a:schemeClr val="tx1"/>
-          </a:fontRef>
-        </p:style>
-      </p:cxnSp>
-      <p:cxnSp>
-        <p:nvCxnSpPr>
-          <p:cNvPr id="44" name="Straight Arrow Connector 43"/>
-          <p:cNvCxnSpPr/>
-          <p:nvPr/>
-        </p:nvCxnSpPr>
-        <p:spPr>
-          <a:xfrm>
-            <a:off x="591923" y="621775"/>
-            <a:ext cx="393797" cy="0"/>
-          </a:xfrm>
-          <a:prstGeom prst="straightConnector1">
-            <a:avLst/>
-          </a:prstGeom>
-          <a:ln w="19050">
-            <a:solidFill>
-              <a:schemeClr val="tx1"/>
-            </a:solidFill>
-            <a:headEnd w="sm" len="sm"/>
-            <a:tailEnd type="arrow" w="sm" len="sm"/>
-          </a:ln>
-        </p:spPr>
-        <p:style>
-          <a:lnRef idx="1">
-            <a:schemeClr val="accent1"/>
-          </a:lnRef>
-          <a:fillRef idx="0">
-            <a:schemeClr val="accent1"/>
-          </a:fillRef>
-          <a:effectRef idx="0">
-            <a:schemeClr val="accent1"/>
-          </a:effectRef>
-          <a:fontRef idx="minor">
-            <a:schemeClr val="tx1"/>
-          </a:fontRef>
-        </p:style>
-      </p:cxnSp>
-      <p:cxnSp>
-        <p:nvCxnSpPr>
-          <p:cNvPr id="47" name="Straight Arrow Connector 46"/>
-          <p:cNvCxnSpPr/>
-          <p:nvPr/>
-        </p:nvCxnSpPr>
-        <p:spPr>
-          <a:xfrm>
-            <a:off x="591922" y="544965"/>
-            <a:ext cx="316988" cy="0"/>
-          </a:xfrm>
-          <a:prstGeom prst="straightConnector1">
-            <a:avLst/>
-          </a:prstGeom>
-          <a:ln w="19050">
-            <a:solidFill>
-              <a:schemeClr val="tx1"/>
-            </a:solidFill>
-            <a:headEnd w="sm" len="sm"/>
-            <a:tailEnd type="arrow" w="sm" len="sm"/>
-          </a:ln>
-        </p:spPr>
-        <p:style>
-          <a:lnRef idx="1">
-            <a:schemeClr val="accent1"/>
-          </a:lnRef>
-          <a:fillRef idx="0">
-            <a:schemeClr val="accent1"/>
-          </a:fillRef>
-          <a:effectRef idx="0">
-            <a:schemeClr val="accent1"/>
-          </a:effectRef>
-          <a:fontRef idx="minor">
-            <a:schemeClr val="tx1"/>
-          </a:fontRef>
-        </p:style>
-      </p:cxnSp>
-      <p:sp>
-        <p:nvSpPr>
-          <p:cNvPr id="48" name="Rectangle 47"/>
+              <a:t>no</a:t>
+            </a:r>
+            <a:endParaRPr lang="en-US" sz="900" dirty="0" smtClean="0">
+              <a:solidFill>
+                <a:schemeClr val="tx1"/>
+              </a:solidFill>
+              <a:latin typeface="Times New Roman" pitchFamily="18" charset="0"/>
+              <a:cs typeface="Times New Roman" pitchFamily="18" charset="0"/>
+            </a:endParaRPr>
+          </a:p>
+        </p:txBody>
+      </p:sp>
+      <p:sp>
+        <p:nvSpPr>
+          <p:cNvPr id="84" name="Rectangle 83"/>
           <p:cNvSpPr/>
           <p:nvPr/>
         </p:nvSpPr>
         <p:spPr>
           <a:xfrm>
-            <a:off x="2061059" y="53775"/>
-            <a:ext cx="614481" cy="769605"/>
+            <a:off x="1460487" y="544965"/>
+            <a:ext cx="436713" cy="211786"/>
           </a:xfrm>
           <a:prstGeom prst="rect">
             <a:avLst/>
           </a:prstGeom>
-          <a:solidFill>
-            <a:srgbClr val="FFFFCC"/>
-          </a:solidFill>
+          <a:noFill/>
           <a:ln w="12700">
-            <a:solidFill>
-              <a:schemeClr val="tx1"/>
-            </a:solidFill>
+            <a:noFill/>
           </a:ln>
         </p:spPr>
         <p:style>
@@ -8566,21 +8482,30 @@
                 <a:latin typeface="Times New Roman" pitchFamily="18" charset="0"/>
                 <a:cs typeface="Times New Roman" pitchFamily="18" charset="0"/>
               </a:rPr>
-              <a:t>Dataflow Flags</a:t>
-            </a:r>
+              <a:t>no</a:t>
+            </a:r>
+            <a:endParaRPr lang="en-US" sz="900" dirty="0" smtClean="0">
+              <a:solidFill>
+                <a:schemeClr val="tx1"/>
+              </a:solidFill>
+              <a:latin typeface="Times New Roman" pitchFamily="18" charset="0"/>
+              <a:cs typeface="Times New Roman" pitchFamily="18" charset="0"/>
+            </a:endParaRPr>
           </a:p>
         </p:txBody>
       </p:sp>
       <p:cxnSp>
         <p:nvCxnSpPr>
-          <p:cNvPr id="50" name="Straight Arrow Connector 49"/>
-          <p:cNvCxnSpPr/>
+          <p:cNvPr id="86" name="Straight Arrow Connector 85"/>
+          <p:cNvCxnSpPr>
+            <a:stCxn id="25" idx="2"/>
+          </p:cNvCxnSpPr>
           <p:nvPr/>
         </p:nvCxnSpPr>
         <p:spPr>
-          <a:xfrm>
-            <a:off x="1752600" y="236487"/>
-            <a:ext cx="308459" cy="0"/>
+          <a:xfrm flipH="1">
+            <a:off x="1050455" y="852841"/>
+            <a:ext cx="1" cy="306604"/>
           </a:xfrm>
           <a:prstGeom prst="straightConnector1">
             <a:avLst/>
@@ -8608,84 +8533,659 @@
           </a:fontRef>
         </p:style>
       </p:cxnSp>
-      <p:cxnSp>
-        <p:nvCxnSpPr>
-          <p:cNvPr id="51" name="Straight Arrow Connector 50"/>
-          <p:cNvCxnSpPr/>
-          <p:nvPr/>
-        </p:nvCxnSpPr>
-        <p:spPr>
-          <a:xfrm>
-            <a:off x="1750770" y="318572"/>
-            <a:ext cx="308459" cy="0"/>
-          </a:xfrm>
-          <a:prstGeom prst="straightConnector1">
-            <a:avLst/>
-          </a:prstGeom>
-          <a:ln w="19050">
-            <a:solidFill>
-              <a:schemeClr val="tx1"/>
-            </a:solidFill>
-            <a:headEnd w="sm" len="sm"/>
-            <a:tailEnd type="arrow" w="sm" len="sm"/>
-          </a:ln>
-        </p:spPr>
-        <p:style>
-          <a:lnRef idx="1">
-            <a:schemeClr val="accent1"/>
-          </a:lnRef>
-          <a:fillRef idx="0">
-            <a:schemeClr val="accent1"/>
-          </a:fillRef>
-          <a:effectRef idx="0">
-            <a:schemeClr val="accent1"/>
-          </a:effectRef>
-          <a:fontRef idx="minor">
-            <a:schemeClr val="tx1"/>
-          </a:fontRef>
-        </p:style>
-      </p:cxnSp>
-      <p:cxnSp>
-        <p:nvCxnSpPr>
-          <p:cNvPr id="52" name="Straight Arrow Connector 51"/>
-          <p:cNvCxnSpPr/>
-          <p:nvPr/>
-        </p:nvCxnSpPr>
-        <p:spPr>
-          <a:xfrm>
-            <a:off x="1752600" y="669760"/>
-            <a:ext cx="308459" cy="0"/>
-          </a:xfrm>
-          <a:prstGeom prst="straightConnector1">
-            <a:avLst/>
-          </a:prstGeom>
-          <a:ln w="19050">
-            <a:solidFill>
-              <a:schemeClr val="tx1"/>
-            </a:solidFill>
-            <a:headEnd w="sm" len="sm"/>
-            <a:tailEnd type="arrow" w="sm" len="sm"/>
-          </a:ln>
-        </p:spPr>
-        <p:style>
-          <a:lnRef idx="1">
-            <a:schemeClr val="accent1"/>
-          </a:lnRef>
-          <a:fillRef idx="0">
-            <a:schemeClr val="accent1"/>
-          </a:fillRef>
-          <a:effectRef idx="0">
-            <a:schemeClr val="accent1"/>
-          </a:effectRef>
-          <a:fontRef idx="minor">
-            <a:schemeClr val="tx1"/>
-          </a:fontRef>
-        </p:style>
-      </p:cxnSp>
+      <p:sp>
+        <p:nvSpPr>
+          <p:cNvPr id="87" name="Rectangle 86"/>
+          <p:cNvSpPr/>
+          <p:nvPr/>
+        </p:nvSpPr>
+        <p:spPr>
+          <a:xfrm>
+            <a:off x="971462" y="852205"/>
+            <a:ext cx="436713" cy="211786"/>
+          </a:xfrm>
+          <a:prstGeom prst="rect">
+            <a:avLst/>
+          </a:prstGeom>
+          <a:noFill/>
+          <a:ln w="12700">
+            <a:noFill/>
+          </a:ln>
+        </p:spPr>
+        <p:style>
+          <a:lnRef idx="2">
+            <a:schemeClr val="accent1">
+              <a:shade val="50000"/>
+            </a:schemeClr>
+          </a:lnRef>
+          <a:fillRef idx="1">
+            <a:schemeClr val="accent1"/>
+          </a:fillRef>
+          <a:effectRef idx="0">
+            <a:schemeClr val="accent1"/>
+          </a:effectRef>
+          <a:fontRef idx="minor">
+            <a:schemeClr val="lt1"/>
+          </a:fontRef>
+        </p:style>
+        <p:txBody>
+          <a:bodyPr rtlCol="0" anchor="ctr"/>
+          <a:lstStyle/>
+          <a:p>
+            <a:pPr algn="ctr"/>
+            <a:r>
+              <a:rPr lang="en-US" sz="900" dirty="0" smtClean="0">
+                <a:solidFill>
+                  <a:schemeClr val="tx1"/>
+                </a:solidFill>
+                <a:latin typeface="Times New Roman" pitchFamily="18" charset="0"/>
+                <a:cs typeface="Times New Roman" pitchFamily="18" charset="0"/>
+              </a:rPr>
+              <a:t>yes</a:t>
+            </a:r>
+            <a:endParaRPr lang="en-US" sz="900" dirty="0" smtClean="0">
+              <a:solidFill>
+                <a:schemeClr val="tx1"/>
+              </a:solidFill>
+              <a:latin typeface="Times New Roman" pitchFamily="18" charset="0"/>
+              <a:cs typeface="Times New Roman" pitchFamily="18" charset="0"/>
+            </a:endParaRPr>
+          </a:p>
+        </p:txBody>
+      </p:sp>
     </p:spTree>
     <p:extLst>
       <p:ext uri="{BB962C8B-B14F-4D97-AF65-F5344CB8AC3E}">
         <p14:creationId xmlns:p14="http://schemas.microsoft.com/office/powerpoint/2010/main" val="3286239923"/>
+      </p:ext>
+    </p:extLst>
+  </p:cSld>
+  <p:clrMapOvr>
+    <a:masterClrMapping/>
+  </p:clrMapOvr>
+</p:sld>
+</file>
+
+<file path=ppt/slides/slide16.xml><?xml version="1.0" encoding="utf-8"?>
+<p:sld xmlns:a="http://schemas.openxmlformats.org/drawingml/2006/main" xmlns:r="http://schemas.openxmlformats.org/officeDocument/2006/relationships" xmlns:p="http://schemas.openxmlformats.org/presentationml/2006/main">
+  <p:cSld>
+    <p:spTree>
+      <p:nvGrpSpPr>
+        <p:cNvPr id="1" name=""/>
+        <p:cNvGrpSpPr/>
+        <p:nvPr/>
+      </p:nvGrpSpPr>
+      <p:grpSpPr>
+        <a:xfrm>
+          <a:off x="0" y="0"/>
+          <a:ext cx="0" cy="0"/>
+          <a:chOff x="0" y="0"/>
+          <a:chExt cx="0" cy="0"/>
+        </a:xfrm>
+      </p:grpSpPr>
+      <p:cxnSp>
+        <p:nvCxnSpPr>
+          <p:cNvPr id="47" name="Straight Connector 46"/>
+          <p:cNvCxnSpPr/>
+          <p:nvPr/>
+        </p:nvCxnSpPr>
+        <p:spPr>
+          <a:xfrm flipH="1" flipV="1">
+            <a:off x="775939" y="151691"/>
+            <a:ext cx="1143655" cy="954397"/>
+          </a:xfrm>
+          <a:prstGeom prst="line">
+            <a:avLst/>
+          </a:prstGeom>
+          <a:ln w="19050">
+            <a:solidFill>
+              <a:schemeClr val="bg1">
+                <a:lumMod val="75000"/>
+              </a:schemeClr>
+            </a:solidFill>
+            <a:prstDash val="dash"/>
+            <a:headEnd type="arrow" w="sm" len="sm"/>
+            <a:tailEnd type="arrow" w="sm" len="sm"/>
+          </a:ln>
+        </p:spPr>
+        <p:style>
+          <a:lnRef idx="1">
+            <a:schemeClr val="accent1"/>
+          </a:lnRef>
+          <a:fillRef idx="0">
+            <a:schemeClr val="accent1"/>
+          </a:fillRef>
+          <a:effectRef idx="0">
+            <a:schemeClr val="accent1"/>
+          </a:effectRef>
+          <a:fontRef idx="minor">
+            <a:schemeClr val="tx1"/>
+          </a:fontRef>
+        </p:style>
+      </p:cxnSp>
+      <p:cxnSp>
+        <p:nvCxnSpPr>
+          <p:cNvPr id="4" name="Straight Arrow Connector 3"/>
+          <p:cNvCxnSpPr/>
+          <p:nvPr/>
+        </p:nvCxnSpPr>
+        <p:spPr>
+          <a:xfrm flipV="1">
+            <a:off x="701475" y="45700"/>
+            <a:ext cx="0" cy="1167099"/>
+          </a:xfrm>
+          <a:prstGeom prst="straightConnector1">
+            <a:avLst/>
+          </a:prstGeom>
+          <a:ln w="19050">
+            <a:solidFill>
+              <a:schemeClr val="tx1"/>
+            </a:solidFill>
+            <a:headEnd w="sm" len="sm"/>
+            <a:tailEnd type="arrow" w="sm" len="sm"/>
+          </a:ln>
+        </p:spPr>
+        <p:style>
+          <a:lnRef idx="1">
+            <a:schemeClr val="accent1"/>
+          </a:lnRef>
+          <a:fillRef idx="0">
+            <a:schemeClr val="accent1"/>
+          </a:fillRef>
+          <a:effectRef idx="0">
+            <a:schemeClr val="accent1"/>
+          </a:effectRef>
+          <a:fontRef idx="minor">
+            <a:schemeClr val="tx1"/>
+          </a:fontRef>
+        </p:style>
+      </p:cxnSp>
+      <p:cxnSp>
+        <p:nvCxnSpPr>
+          <p:cNvPr id="6" name="Straight Arrow Connector 5"/>
+          <p:cNvCxnSpPr/>
+          <p:nvPr/>
+        </p:nvCxnSpPr>
+        <p:spPr>
+          <a:xfrm>
+            <a:off x="625244" y="1121039"/>
+            <a:ext cx="1459390" cy="0"/>
+          </a:xfrm>
+          <a:prstGeom prst="straightConnector1">
+            <a:avLst/>
+          </a:prstGeom>
+          <a:ln w="19050">
+            <a:solidFill>
+              <a:schemeClr val="tx1"/>
+            </a:solidFill>
+            <a:headEnd w="sm" len="sm"/>
+            <a:tailEnd type="arrow" w="sm" len="sm"/>
+          </a:ln>
+        </p:spPr>
+        <p:style>
+          <a:lnRef idx="1">
+            <a:schemeClr val="accent1"/>
+          </a:lnRef>
+          <a:fillRef idx="0">
+            <a:schemeClr val="accent1"/>
+          </a:fillRef>
+          <a:effectRef idx="0">
+            <a:schemeClr val="accent1"/>
+          </a:effectRef>
+          <a:fontRef idx="minor">
+            <a:schemeClr val="tx1"/>
+          </a:fontRef>
+        </p:style>
+      </p:cxnSp>
+      <p:sp>
+        <p:nvSpPr>
+          <p:cNvPr id="8" name="Rectangle 7"/>
+          <p:cNvSpPr/>
+          <p:nvPr/>
+        </p:nvSpPr>
+        <p:spPr>
+          <a:xfrm>
+            <a:off x="1021650" y="1112536"/>
+            <a:ext cx="1178199" cy="200529"/>
+          </a:xfrm>
+          <a:prstGeom prst="rect">
+            <a:avLst/>
+          </a:prstGeom>
+          <a:noFill/>
+          <a:ln>
+            <a:noFill/>
+          </a:ln>
+        </p:spPr>
+        <p:style>
+          <a:lnRef idx="2">
+            <a:schemeClr val="accent2">
+              <a:shade val="50000"/>
+            </a:schemeClr>
+          </a:lnRef>
+          <a:fillRef idx="1">
+            <a:schemeClr val="accent2"/>
+          </a:fillRef>
+          <a:effectRef idx="0">
+            <a:schemeClr val="accent2"/>
+          </a:effectRef>
+          <a:fontRef idx="minor">
+            <a:schemeClr val="lt1"/>
+          </a:fontRef>
+        </p:style>
+        <p:txBody>
+          <a:bodyPr rtlCol="0" anchor="ctr"/>
+          <a:lstStyle/>
+          <a:p>
+            <a:r>
+              <a:rPr lang="en-US" sz="900" dirty="0" smtClean="0">
+                <a:solidFill>
+                  <a:schemeClr val="tx1"/>
+                </a:solidFill>
+                <a:latin typeface="Times New Roman" pitchFamily="18" charset="0"/>
+                <a:cs typeface="Times New Roman" pitchFamily="18" charset="0"/>
+              </a:rPr>
+              <a:t>overhead matching</a:t>
+            </a:r>
+            <a:endParaRPr lang="en-US" sz="900" dirty="0">
+              <a:solidFill>
+                <a:schemeClr val="tx1"/>
+              </a:solidFill>
+              <a:latin typeface="Times New Roman" pitchFamily="18" charset="0"/>
+              <a:cs typeface="Times New Roman" pitchFamily="18" charset="0"/>
+            </a:endParaRPr>
+          </a:p>
+        </p:txBody>
+      </p:sp>
+      <p:sp>
+        <p:nvSpPr>
+          <p:cNvPr id="9" name="Rectangle 8"/>
+          <p:cNvSpPr/>
+          <p:nvPr/>
+        </p:nvSpPr>
+        <p:spPr>
+          <a:xfrm rot="16200000">
+            <a:off x="281924" y="528985"/>
+            <a:ext cx="597840" cy="200529"/>
+          </a:xfrm>
+          <a:prstGeom prst="rect">
+            <a:avLst/>
+          </a:prstGeom>
+          <a:noFill/>
+          <a:ln>
+            <a:noFill/>
+          </a:ln>
+        </p:spPr>
+        <p:style>
+          <a:lnRef idx="2">
+            <a:schemeClr val="accent2">
+              <a:shade val="50000"/>
+            </a:schemeClr>
+          </a:lnRef>
+          <a:fillRef idx="1">
+            <a:schemeClr val="accent2"/>
+          </a:fillRef>
+          <a:effectRef idx="0">
+            <a:schemeClr val="accent2"/>
+          </a:effectRef>
+          <a:fontRef idx="minor">
+            <a:schemeClr val="lt1"/>
+          </a:fontRef>
+        </p:style>
+        <p:txBody>
+          <a:bodyPr rtlCol="0" anchor="ctr"/>
+          <a:lstStyle/>
+          <a:p>
+            <a:r>
+              <a:rPr lang="en-US" sz="900" dirty="0" smtClean="0">
+                <a:solidFill>
+                  <a:schemeClr val="tx1"/>
+                </a:solidFill>
+                <a:latin typeface="Times New Roman" pitchFamily="18" charset="0"/>
+                <a:cs typeface="Times New Roman" pitchFamily="18" charset="0"/>
+              </a:rPr>
+              <a:t>coverage</a:t>
+            </a:r>
+            <a:endParaRPr lang="en-US" sz="900" dirty="0">
+              <a:solidFill>
+                <a:schemeClr val="tx1"/>
+              </a:solidFill>
+              <a:latin typeface="Times New Roman" pitchFamily="18" charset="0"/>
+              <a:cs typeface="Times New Roman" pitchFamily="18" charset="0"/>
+            </a:endParaRPr>
+          </a:p>
+        </p:txBody>
+      </p:sp>
+      <p:sp>
+        <p:nvSpPr>
+          <p:cNvPr id="43" name="Rectangle 42"/>
+          <p:cNvSpPr/>
+          <p:nvPr/>
+        </p:nvSpPr>
+        <p:spPr>
+          <a:xfrm>
+            <a:off x="931676" y="152411"/>
+            <a:ext cx="1075341" cy="200529"/>
+          </a:xfrm>
+          <a:prstGeom prst="rect">
+            <a:avLst/>
+          </a:prstGeom>
+          <a:noFill/>
+          <a:ln>
+            <a:noFill/>
+          </a:ln>
+        </p:spPr>
+        <p:style>
+          <a:lnRef idx="2">
+            <a:schemeClr val="accent2">
+              <a:shade val="50000"/>
+            </a:schemeClr>
+          </a:lnRef>
+          <a:fillRef idx="1">
+            <a:schemeClr val="accent2"/>
+          </a:fillRef>
+          <a:effectRef idx="0">
+            <a:schemeClr val="accent2"/>
+          </a:effectRef>
+          <a:fontRef idx="minor">
+            <a:schemeClr val="lt1"/>
+          </a:fontRef>
+        </p:style>
+        <p:txBody>
+          <a:bodyPr rtlCol="0" anchor="ctr"/>
+          <a:lstStyle/>
+          <a:p>
+            <a:r>
+              <a:rPr lang="en-US" sz="900" dirty="0" smtClean="0">
+                <a:solidFill>
+                  <a:schemeClr val="tx1"/>
+                </a:solidFill>
+                <a:latin typeface="Times New Roman" pitchFamily="18" charset="0"/>
+                <a:cs typeface="Times New Roman" pitchFamily="18" charset="0"/>
+              </a:rPr>
+              <a:t>source dropping</a:t>
+            </a:r>
+            <a:endParaRPr lang="en-US" sz="900" dirty="0">
+              <a:solidFill>
+                <a:schemeClr val="tx1"/>
+              </a:solidFill>
+              <a:latin typeface="Times New Roman" pitchFamily="18" charset="0"/>
+              <a:cs typeface="Times New Roman" pitchFamily="18" charset="0"/>
+            </a:endParaRPr>
+          </a:p>
+        </p:txBody>
+      </p:sp>
+      <p:sp>
+        <p:nvSpPr>
+          <p:cNvPr id="45" name="Cross 44"/>
+          <p:cNvSpPr/>
+          <p:nvPr/>
+        </p:nvSpPr>
+        <p:spPr>
+          <a:xfrm rot="2691789">
+            <a:off x="841131" y="205085"/>
+            <a:ext cx="115215" cy="115215"/>
+          </a:xfrm>
+          <a:prstGeom prst="plus">
+            <a:avLst>
+              <a:gd name="adj" fmla="val 50000"/>
+            </a:avLst>
+          </a:prstGeom>
+          <a:solidFill>
+            <a:schemeClr val="tx1"/>
+          </a:solidFill>
+          <a:ln>
+            <a:solidFill>
+              <a:schemeClr val="tx1"/>
+            </a:solidFill>
+          </a:ln>
+        </p:spPr>
+        <p:style>
+          <a:lnRef idx="2">
+            <a:schemeClr val="accent1">
+              <a:shade val="50000"/>
+            </a:schemeClr>
+          </a:lnRef>
+          <a:fillRef idx="1">
+            <a:schemeClr val="accent1"/>
+          </a:fillRef>
+          <a:effectRef idx="0">
+            <a:schemeClr val="accent1"/>
+          </a:effectRef>
+          <a:fontRef idx="minor">
+            <a:schemeClr val="lt1"/>
+          </a:fontRef>
+        </p:style>
+        <p:txBody>
+          <a:bodyPr rtlCol="0" anchor="ctr"/>
+          <a:lstStyle/>
+          <a:p>
+            <a:pPr algn="ctr"/>
+            <a:endParaRPr lang="en-US"/>
+          </a:p>
+        </p:txBody>
+      </p:sp>
+      <p:sp>
+        <p:nvSpPr>
+          <p:cNvPr id="55" name="Rectangle 54"/>
+          <p:cNvSpPr/>
+          <p:nvPr/>
+        </p:nvSpPr>
+        <p:spPr>
+          <a:xfrm>
+            <a:off x="1317021" y="468155"/>
+            <a:ext cx="1166494" cy="200529"/>
+          </a:xfrm>
+          <a:prstGeom prst="rect">
+            <a:avLst/>
+          </a:prstGeom>
+          <a:noFill/>
+          <a:ln>
+            <a:noFill/>
+          </a:ln>
+        </p:spPr>
+        <p:style>
+          <a:lnRef idx="2">
+            <a:schemeClr val="accent2">
+              <a:shade val="50000"/>
+            </a:schemeClr>
+          </a:lnRef>
+          <a:fillRef idx="1">
+            <a:schemeClr val="accent2"/>
+          </a:fillRef>
+          <a:effectRef idx="0">
+            <a:schemeClr val="accent2"/>
+          </a:effectRef>
+          <a:fontRef idx="minor">
+            <a:schemeClr val="lt1"/>
+          </a:fontRef>
+        </p:style>
+        <p:txBody>
+          <a:bodyPr rtlCol="0" anchor="ctr"/>
+          <a:lstStyle/>
+          <a:p>
+            <a:r>
+              <a:rPr lang="en-US" sz="900" dirty="0" smtClean="0">
+                <a:solidFill>
+                  <a:schemeClr val="tx1"/>
+                </a:solidFill>
+                <a:latin typeface="Times New Roman" pitchFamily="18" charset="0"/>
+                <a:cs typeface="Times New Roman" pitchFamily="18" charset="0"/>
+              </a:rPr>
+              <a:t>sub-flow dropping</a:t>
+            </a:r>
+            <a:endParaRPr lang="en-US" sz="900" dirty="0">
+              <a:solidFill>
+                <a:schemeClr val="tx1"/>
+              </a:solidFill>
+              <a:latin typeface="Times New Roman" pitchFamily="18" charset="0"/>
+              <a:cs typeface="Times New Roman" pitchFamily="18" charset="0"/>
+            </a:endParaRPr>
+          </a:p>
+        </p:txBody>
+      </p:sp>
+      <p:sp>
+        <p:nvSpPr>
+          <p:cNvPr id="59" name="Cross 58"/>
+          <p:cNvSpPr/>
+          <p:nvPr/>
+        </p:nvSpPr>
+        <p:spPr>
+          <a:xfrm rot="2691789">
+            <a:off x="1240012" y="528005"/>
+            <a:ext cx="115215" cy="115215"/>
+          </a:xfrm>
+          <a:prstGeom prst="plus">
+            <a:avLst>
+              <a:gd name="adj" fmla="val 50000"/>
+            </a:avLst>
+          </a:prstGeom>
+          <a:solidFill>
+            <a:schemeClr val="tx1"/>
+          </a:solidFill>
+          <a:ln>
+            <a:solidFill>
+              <a:schemeClr val="tx1"/>
+            </a:solidFill>
+          </a:ln>
+        </p:spPr>
+        <p:style>
+          <a:lnRef idx="2">
+            <a:schemeClr val="accent1">
+              <a:shade val="50000"/>
+            </a:schemeClr>
+          </a:lnRef>
+          <a:fillRef idx="1">
+            <a:schemeClr val="accent1"/>
+          </a:fillRef>
+          <a:effectRef idx="0">
+            <a:schemeClr val="accent1"/>
+          </a:effectRef>
+          <a:fontRef idx="minor">
+            <a:schemeClr val="lt1"/>
+          </a:fontRef>
+        </p:style>
+        <p:txBody>
+          <a:bodyPr rtlCol="0" anchor="ctr"/>
+          <a:lstStyle/>
+          <a:p>
+            <a:pPr algn="ctr"/>
+            <a:endParaRPr lang="en-US"/>
+          </a:p>
+        </p:txBody>
+      </p:sp>
+      <p:sp>
+        <p:nvSpPr>
+          <p:cNvPr id="18" name="Rectangle 17"/>
+          <p:cNvSpPr/>
+          <p:nvPr/>
+        </p:nvSpPr>
+        <p:spPr>
+          <a:xfrm>
+            <a:off x="1739476" y="831694"/>
+            <a:ext cx="1166494" cy="200529"/>
+          </a:xfrm>
+          <a:prstGeom prst="rect">
+            <a:avLst/>
+          </a:prstGeom>
+          <a:noFill/>
+          <a:ln>
+            <a:noFill/>
+          </a:ln>
+        </p:spPr>
+        <p:style>
+          <a:lnRef idx="2">
+            <a:schemeClr val="accent2">
+              <a:shade val="50000"/>
+            </a:schemeClr>
+          </a:lnRef>
+          <a:fillRef idx="1">
+            <a:schemeClr val="accent2"/>
+          </a:fillRef>
+          <a:effectRef idx="0">
+            <a:schemeClr val="accent2"/>
+          </a:effectRef>
+          <a:fontRef idx="minor">
+            <a:schemeClr val="lt1"/>
+          </a:fontRef>
+        </p:style>
+        <p:txBody>
+          <a:bodyPr rtlCol="0" anchor="ctr"/>
+          <a:lstStyle/>
+          <a:p>
+            <a:r>
+              <a:rPr lang="en-US" sz="900" dirty="0" smtClean="0">
+                <a:solidFill>
+                  <a:schemeClr val="tx1"/>
+                </a:solidFill>
+                <a:latin typeface="Times New Roman" pitchFamily="18" charset="0"/>
+                <a:cs typeface="Times New Roman" pitchFamily="18" charset="0"/>
+              </a:rPr>
+              <a:t>unrestricted dropping</a:t>
+            </a:r>
+            <a:endParaRPr lang="en-US" sz="900" dirty="0">
+              <a:solidFill>
+                <a:schemeClr val="tx1"/>
+              </a:solidFill>
+              <a:latin typeface="Times New Roman" pitchFamily="18" charset="0"/>
+              <a:cs typeface="Times New Roman" pitchFamily="18" charset="0"/>
+            </a:endParaRPr>
+          </a:p>
+        </p:txBody>
+      </p:sp>
+      <p:sp>
+        <p:nvSpPr>
+          <p:cNvPr id="19" name="Cross 18"/>
+          <p:cNvSpPr/>
+          <p:nvPr/>
+        </p:nvSpPr>
+        <p:spPr>
+          <a:xfrm rot="2691789">
+            <a:off x="1662467" y="891544"/>
+            <a:ext cx="115215" cy="115215"/>
+          </a:xfrm>
+          <a:prstGeom prst="plus">
+            <a:avLst>
+              <a:gd name="adj" fmla="val 50000"/>
+            </a:avLst>
+          </a:prstGeom>
+          <a:solidFill>
+            <a:schemeClr val="tx1"/>
+          </a:solidFill>
+          <a:ln>
+            <a:solidFill>
+              <a:schemeClr val="tx1"/>
+            </a:solidFill>
+          </a:ln>
+        </p:spPr>
+        <p:style>
+          <a:lnRef idx="2">
+            <a:schemeClr val="accent1">
+              <a:shade val="50000"/>
+            </a:schemeClr>
+          </a:lnRef>
+          <a:fillRef idx="1">
+            <a:schemeClr val="accent1"/>
+          </a:fillRef>
+          <a:effectRef idx="0">
+            <a:schemeClr val="accent1"/>
+          </a:effectRef>
+          <a:fontRef idx="minor">
+            <a:schemeClr val="lt1"/>
+          </a:fontRef>
+        </p:style>
+        <p:txBody>
+          <a:bodyPr rtlCol="0" anchor="ctr"/>
+          <a:lstStyle/>
+          <a:p>
+            <a:pPr algn="ctr"/>
+            <a:endParaRPr lang="en-US"/>
+          </a:p>
+        </p:txBody>
+      </p:sp>
+    </p:spTree>
+    <p:extLst>
+      <p:ext uri="{BB962C8B-B14F-4D97-AF65-F5344CB8AC3E}">
+        <p14:creationId xmlns:p14="http://schemas.microsoft.com/office/powerpoint/2010/main" val="2267601811"/>
       </p:ext>
     </p:extLst>
   </p:cSld>

</xml_diff>

<commit_message>
Moved null filtering into Section 3.
</commit_message>
<xml_diff>
--- a/figs_src/diagrams.pptx
+++ b/figs_src/diagrams.pptx
@@ -5,7 +5,7 @@
     <p:sldMasterId id="2147483648" r:id="rId1"/>
   </p:sldMasterIdLst>
   <p:notesMasterIdLst>
-    <p:notesMasterId r:id="rId22"/>
+    <p:notesMasterId r:id="rId23"/>
   </p:notesMasterIdLst>
   <p:sldIdLst>
     <p:sldId id="256" r:id="rId2"/>
@@ -28,6 +28,7 @@
     <p:sldId id="279" r:id="rId19"/>
     <p:sldId id="280" r:id="rId20"/>
     <p:sldId id="281" r:id="rId21"/>
+    <p:sldId id="282" r:id="rId22"/>
   </p:sldIdLst>
   <p:sldSz cx="3200400" cy="7772400"/>
   <p:notesSz cx="2743200" cy="7315200"/>
@@ -211,7 +212,7 @@
           <a:p>
             <a:fld id="{843567C3-09B7-4EC5-8695-9659B6A4537F}" type="datetimeFigureOut">
               <a:rPr lang="en-US" smtClean="0"/>
-              <a:t>9/5/2014</a:t>
+              <a:t>9/11/2014</a:t>
             </a:fld>
             <a:endParaRPr lang="en-US"/>
           </a:p>
@@ -661,7 +662,7 @@
             <a:fld id="{1D8BD707-D9CF-40AE-B4C6-C98DA3205C09}" type="datetimeFigureOut">
               <a:rPr lang="en-US" smtClean="0"/>
               <a:pPr/>
-              <a:t>9/5/2014</a:t>
+              <a:t>9/11/2014</a:t>
             </a:fld>
             <a:endParaRPr lang="en-US"/>
           </a:p>
@@ -828,7 +829,7 @@
             <a:fld id="{1D8BD707-D9CF-40AE-B4C6-C98DA3205C09}" type="datetimeFigureOut">
               <a:rPr lang="en-US" smtClean="0"/>
               <a:pPr/>
-              <a:t>9/5/2014</a:t>
+              <a:t>9/11/2014</a:t>
             </a:fld>
             <a:endParaRPr lang="en-US"/>
           </a:p>
@@ -1005,7 +1006,7 @@
             <a:fld id="{1D8BD707-D9CF-40AE-B4C6-C98DA3205C09}" type="datetimeFigureOut">
               <a:rPr lang="en-US" smtClean="0"/>
               <a:pPr/>
-              <a:t>9/5/2014</a:t>
+              <a:t>9/11/2014</a:t>
             </a:fld>
             <a:endParaRPr lang="en-US"/>
           </a:p>
@@ -1172,7 +1173,7 @@
             <a:fld id="{1D8BD707-D9CF-40AE-B4C6-C98DA3205C09}" type="datetimeFigureOut">
               <a:rPr lang="en-US" smtClean="0"/>
               <a:pPr/>
-              <a:t>9/5/2014</a:t>
+              <a:t>9/11/2014</a:t>
             </a:fld>
             <a:endParaRPr lang="en-US"/>
           </a:p>
@@ -1415,7 +1416,7 @@
             <a:fld id="{1D8BD707-D9CF-40AE-B4C6-C98DA3205C09}" type="datetimeFigureOut">
               <a:rPr lang="en-US" smtClean="0"/>
               <a:pPr/>
-              <a:t>9/5/2014</a:t>
+              <a:t>9/11/2014</a:t>
             </a:fld>
             <a:endParaRPr lang="en-US"/>
           </a:p>
@@ -1700,7 +1701,7 @@
             <a:fld id="{1D8BD707-D9CF-40AE-B4C6-C98DA3205C09}" type="datetimeFigureOut">
               <a:rPr lang="en-US" smtClean="0"/>
               <a:pPr/>
-              <a:t>9/5/2014</a:t>
+              <a:t>9/11/2014</a:t>
             </a:fld>
             <a:endParaRPr lang="en-US"/>
           </a:p>
@@ -2119,7 +2120,7 @@
             <a:fld id="{1D8BD707-D9CF-40AE-B4C6-C98DA3205C09}" type="datetimeFigureOut">
               <a:rPr lang="en-US" smtClean="0"/>
               <a:pPr/>
-              <a:t>9/5/2014</a:t>
+              <a:t>9/11/2014</a:t>
             </a:fld>
             <a:endParaRPr lang="en-US"/>
           </a:p>
@@ -2234,7 +2235,7 @@
             <a:fld id="{1D8BD707-D9CF-40AE-B4C6-C98DA3205C09}" type="datetimeFigureOut">
               <a:rPr lang="en-US" smtClean="0"/>
               <a:pPr/>
-              <a:t>9/5/2014</a:t>
+              <a:t>9/11/2014</a:t>
             </a:fld>
             <a:endParaRPr lang="en-US"/>
           </a:p>
@@ -2326,7 +2327,7 @@
             <a:fld id="{1D8BD707-D9CF-40AE-B4C6-C98DA3205C09}" type="datetimeFigureOut">
               <a:rPr lang="en-US" smtClean="0"/>
               <a:pPr/>
-              <a:t>9/5/2014</a:t>
+              <a:t>9/11/2014</a:t>
             </a:fld>
             <a:endParaRPr lang="en-US"/>
           </a:p>
@@ -2600,7 +2601,7 @@
             <a:fld id="{1D8BD707-D9CF-40AE-B4C6-C98DA3205C09}" type="datetimeFigureOut">
               <a:rPr lang="en-US" smtClean="0"/>
               <a:pPr/>
-              <a:t>9/5/2014</a:t>
+              <a:t>9/11/2014</a:t>
             </a:fld>
             <a:endParaRPr lang="en-US"/>
           </a:p>
@@ -2850,7 +2851,7 @@
             <a:fld id="{1D8BD707-D9CF-40AE-B4C6-C98DA3205C09}" type="datetimeFigureOut">
               <a:rPr lang="en-US" smtClean="0"/>
               <a:pPr/>
-              <a:t>9/5/2014</a:t>
+              <a:t>9/11/2014</a:t>
             </a:fld>
             <a:endParaRPr lang="en-US"/>
           </a:p>
@@ -3060,7 +3061,7 @@
             <a:fld id="{1D8BD707-D9CF-40AE-B4C6-C98DA3205C09}" type="datetimeFigureOut">
               <a:rPr lang="en-US" smtClean="0"/>
               <a:pPr/>
-              <a:t>9/5/2014</a:t>
+              <a:t>9/11/2014</a:t>
             </a:fld>
             <a:endParaRPr lang="en-US"/>
           </a:p>
@@ -12776,6 +12777,1036 @@
     <p:extLst>
       <p:ext uri="{BB962C8B-B14F-4D97-AF65-F5344CB8AC3E}">
         <p14:creationId xmlns:p14="http://schemas.microsoft.com/office/powerpoint/2010/main" val="2337282895"/>
+      </p:ext>
+    </p:extLst>
+  </p:cSld>
+  <p:clrMapOvr>
+    <a:masterClrMapping/>
+  </p:clrMapOvr>
+</p:sld>
+</file>
+
+<file path=ppt/slides/slide21.xml><?xml version="1.0" encoding="utf-8"?>
+<p:sld xmlns:a="http://schemas.openxmlformats.org/drawingml/2006/main" xmlns:r="http://schemas.openxmlformats.org/officeDocument/2006/relationships" xmlns:p="http://schemas.openxmlformats.org/presentationml/2006/main">
+  <p:cSld>
+    <p:spTree>
+      <p:nvGrpSpPr>
+        <p:cNvPr id="1" name=""/>
+        <p:cNvGrpSpPr/>
+        <p:nvPr/>
+      </p:nvGrpSpPr>
+      <p:grpSpPr>
+        <a:xfrm>
+          <a:off x="0" y="0"/>
+          <a:ext cx="0" cy="0"/>
+          <a:chOff x="0" y="0"/>
+          <a:chExt cx="0" cy="0"/>
+        </a:xfrm>
+      </p:grpSpPr>
+      <p:sp>
+        <p:nvSpPr>
+          <p:cNvPr id="4" name="TextBox 3"/>
+          <p:cNvSpPr txBox="1"/>
+          <p:nvPr/>
+        </p:nvSpPr>
+        <p:spPr>
+          <a:xfrm>
+            <a:off x="25595" y="164543"/>
+            <a:ext cx="1382580" cy="1384995"/>
+          </a:xfrm>
+          <a:prstGeom prst="rect">
+            <a:avLst/>
+          </a:prstGeom>
+          <a:noFill/>
+        </p:spPr>
+        <p:txBody>
+          <a:bodyPr wrap="square" rtlCol="0">
+            <a:spAutoFit/>
+          </a:bodyPr>
+          <a:lstStyle/>
+          <a:p>
+            <a:r>
+              <a:rPr lang="en-US" sz="600" dirty="0">
+                <a:latin typeface="Consolas" pitchFamily="49" charset="0"/>
+                <a:cs typeface="Consolas" pitchFamily="49" charset="0"/>
+              </a:rPr>
+              <a:t>1: call </a:t>
+            </a:r>
+            <a:r>
+              <a:rPr lang="en-US" sz="600" dirty="0" err="1">
+                <a:latin typeface="Consolas" pitchFamily="49" charset="0"/>
+                <a:cs typeface="Consolas" pitchFamily="49" charset="0"/>
+              </a:rPr>
+              <a:t>malloc</a:t>
+            </a:r>
+            <a:r>
+              <a:rPr lang="en-US" sz="600" dirty="0">
+                <a:latin typeface="Consolas" pitchFamily="49" charset="0"/>
+                <a:cs typeface="Consolas" pitchFamily="49" charset="0"/>
+              </a:rPr>
+              <a:t> ;return pointer 0x12340000 in r1</a:t>
+            </a:r>
+          </a:p>
+          <a:p>
+            <a:endParaRPr lang="en-US" sz="600" dirty="0" smtClean="0">
+              <a:latin typeface="Consolas" pitchFamily="49" charset="0"/>
+              <a:cs typeface="Consolas" pitchFamily="49" charset="0"/>
+            </a:endParaRPr>
+          </a:p>
+          <a:p>
+            <a:r>
+              <a:rPr lang="en-US" sz="600" dirty="0" smtClean="0">
+                <a:latin typeface="Consolas" pitchFamily="49" charset="0"/>
+                <a:cs typeface="Consolas" pitchFamily="49" charset="0"/>
+              </a:rPr>
+              <a:t>2</a:t>
+            </a:r>
+            <a:r>
+              <a:rPr lang="en-US" sz="600" dirty="0">
+                <a:latin typeface="Consolas" pitchFamily="49" charset="0"/>
+                <a:cs typeface="Consolas" pitchFamily="49" charset="0"/>
+              </a:rPr>
+              <a:t>: </a:t>
+            </a:r>
+            <a:r>
+              <a:rPr lang="en-US" sz="600" dirty="0" err="1" smtClean="0">
+                <a:latin typeface="Consolas" pitchFamily="49" charset="0"/>
+                <a:cs typeface="Consolas" pitchFamily="49" charset="0"/>
+              </a:rPr>
+              <a:t>mov</a:t>
+            </a:r>
+            <a:r>
+              <a:rPr lang="en-US" sz="600" dirty="0" smtClean="0">
+                <a:latin typeface="Consolas" pitchFamily="49" charset="0"/>
+                <a:cs typeface="Consolas" pitchFamily="49" charset="0"/>
+              </a:rPr>
+              <a:t> </a:t>
+            </a:r>
+            <a:r>
+              <a:rPr lang="en-US" sz="600" dirty="0">
+                <a:latin typeface="Consolas" pitchFamily="49" charset="0"/>
+                <a:cs typeface="Consolas" pitchFamily="49" charset="0"/>
+              </a:rPr>
+              <a:t>r2</a:t>
+            </a:r>
+            <a:r>
+              <a:rPr lang="en-US" sz="600" dirty="0" smtClean="0">
+                <a:latin typeface="Consolas" pitchFamily="49" charset="0"/>
+                <a:cs typeface="Consolas" pitchFamily="49" charset="0"/>
+              </a:rPr>
+              <a:t>, #8</a:t>
+            </a:r>
+          </a:p>
+          <a:p>
+            <a:r>
+              <a:rPr lang="en-US" sz="600" dirty="0">
+                <a:latin typeface="Consolas" pitchFamily="49" charset="0"/>
+                <a:cs typeface="Consolas" pitchFamily="49" charset="0"/>
+              </a:rPr>
+              <a:t> </a:t>
+            </a:r>
+            <a:r>
+              <a:rPr lang="en-US" sz="600" dirty="0" smtClean="0">
+                <a:latin typeface="Consolas" pitchFamily="49" charset="0"/>
+                <a:cs typeface="Consolas" pitchFamily="49" charset="0"/>
+              </a:rPr>
+              <a:t> ; r2 is not a pointer</a:t>
+            </a:r>
+            <a:endParaRPr lang="en-US" sz="600" dirty="0">
+              <a:latin typeface="Consolas" pitchFamily="49" charset="0"/>
+              <a:cs typeface="Consolas" pitchFamily="49" charset="0"/>
+            </a:endParaRPr>
+          </a:p>
+          <a:p>
+            <a:endParaRPr lang="en-US" sz="600" dirty="0">
+              <a:latin typeface="Consolas" pitchFamily="49" charset="0"/>
+              <a:cs typeface="Consolas" pitchFamily="49" charset="0"/>
+            </a:endParaRPr>
+          </a:p>
+          <a:p>
+            <a:r>
+              <a:rPr lang="en-US" sz="600" dirty="0">
+                <a:latin typeface="Consolas" pitchFamily="49" charset="0"/>
+                <a:cs typeface="Consolas" pitchFamily="49" charset="0"/>
+              </a:rPr>
+              <a:t>3a: </a:t>
+            </a:r>
+            <a:r>
+              <a:rPr lang="en-US" sz="600" dirty="0" err="1">
+                <a:latin typeface="Consolas" pitchFamily="49" charset="0"/>
+                <a:cs typeface="Consolas" pitchFamily="49" charset="0"/>
+              </a:rPr>
+              <a:t>mov</a:t>
+            </a:r>
+            <a:r>
+              <a:rPr lang="en-US" sz="600" dirty="0">
+                <a:latin typeface="Consolas" pitchFamily="49" charset="0"/>
+                <a:cs typeface="Consolas" pitchFamily="49" charset="0"/>
+              </a:rPr>
+              <a:t> r3, #1</a:t>
+            </a:r>
+          </a:p>
+          <a:p>
+            <a:endParaRPr lang="en-US" sz="600" dirty="0">
+              <a:latin typeface="Consolas" pitchFamily="49" charset="0"/>
+              <a:cs typeface="Consolas" pitchFamily="49" charset="0"/>
+            </a:endParaRPr>
+          </a:p>
+          <a:p>
+            <a:r>
+              <a:rPr lang="en-US" sz="600" dirty="0">
+                <a:latin typeface="Consolas" pitchFamily="49" charset="0"/>
+                <a:cs typeface="Consolas" pitchFamily="49" charset="0"/>
+              </a:rPr>
+              <a:t>3b: </a:t>
+            </a:r>
+            <a:r>
+              <a:rPr lang="en-US" sz="600" dirty="0" err="1">
+                <a:latin typeface="Consolas" pitchFamily="49" charset="0"/>
+                <a:cs typeface="Consolas" pitchFamily="49" charset="0"/>
+              </a:rPr>
+              <a:t>str</a:t>
+            </a:r>
+            <a:r>
+              <a:rPr lang="en-US" sz="600" dirty="0">
+                <a:latin typeface="Consolas" pitchFamily="49" charset="0"/>
+                <a:cs typeface="Consolas" pitchFamily="49" charset="0"/>
+              </a:rPr>
+              <a:t> r3, [r1, #12]</a:t>
+            </a:r>
+          </a:p>
+          <a:p>
+            <a:r>
+              <a:rPr lang="en-US" sz="600" dirty="0">
+                <a:latin typeface="Consolas" pitchFamily="49" charset="0"/>
+                <a:cs typeface="Consolas" pitchFamily="49" charset="0"/>
+              </a:rPr>
+              <a:t>    ; store to 0x1234000c</a:t>
+            </a:r>
+          </a:p>
+          <a:p>
+            <a:endParaRPr lang="en-US" sz="600" dirty="0">
+              <a:latin typeface="Consolas" pitchFamily="49" charset="0"/>
+              <a:cs typeface="Consolas" pitchFamily="49" charset="0"/>
+            </a:endParaRPr>
+          </a:p>
+          <a:p>
+            <a:endParaRPr lang="en-US" sz="600" dirty="0">
+              <a:latin typeface="Consolas" pitchFamily="49" charset="0"/>
+              <a:cs typeface="Consolas" pitchFamily="49" charset="0"/>
+            </a:endParaRPr>
+          </a:p>
+          <a:p>
+            <a:endParaRPr lang="en-US" sz="600" dirty="0" smtClean="0">
+              <a:latin typeface="Consolas" pitchFamily="49" charset="0"/>
+              <a:cs typeface="Consolas" pitchFamily="49" charset="0"/>
+            </a:endParaRPr>
+          </a:p>
+          <a:p>
+            <a:r>
+              <a:rPr lang="en-US" sz="600" dirty="0" smtClean="0">
+                <a:latin typeface="Consolas" pitchFamily="49" charset="0"/>
+                <a:cs typeface="Consolas" pitchFamily="49" charset="0"/>
+              </a:rPr>
+              <a:t>4</a:t>
+            </a:r>
+            <a:r>
+              <a:rPr lang="en-US" sz="600" dirty="0">
+                <a:latin typeface="Consolas" pitchFamily="49" charset="0"/>
+                <a:cs typeface="Consolas" pitchFamily="49" charset="0"/>
+              </a:rPr>
+              <a:t>: </a:t>
+            </a:r>
+            <a:r>
+              <a:rPr lang="en-US" sz="600" dirty="0" smtClean="0">
+                <a:latin typeface="Consolas" pitchFamily="49" charset="0"/>
+                <a:cs typeface="Consolas" pitchFamily="49" charset="0"/>
+              </a:rPr>
+              <a:t>add r2, r2</a:t>
+            </a:r>
+            <a:r>
+              <a:rPr lang="en-US" sz="600" dirty="0">
+                <a:latin typeface="Consolas" pitchFamily="49" charset="0"/>
+                <a:cs typeface="Consolas" pitchFamily="49" charset="0"/>
+              </a:rPr>
+              <a:t>, </a:t>
+            </a:r>
+            <a:r>
+              <a:rPr lang="en-US" sz="600" dirty="0" smtClean="0">
+                <a:latin typeface="Consolas" pitchFamily="49" charset="0"/>
+                <a:cs typeface="Consolas" pitchFamily="49" charset="0"/>
+              </a:rPr>
+              <a:t>r3</a:t>
+            </a:r>
+            <a:endParaRPr lang="en-US" sz="600" dirty="0">
+              <a:latin typeface="Consolas" pitchFamily="49" charset="0"/>
+              <a:cs typeface="Consolas" pitchFamily="49" charset="0"/>
+            </a:endParaRPr>
+          </a:p>
+        </p:txBody>
+      </p:sp>
+      <p:sp>
+        <p:nvSpPr>
+          <p:cNvPr id="6" name="TextBox 5"/>
+          <p:cNvSpPr txBox="1"/>
+          <p:nvPr/>
+        </p:nvSpPr>
+        <p:spPr>
+          <a:xfrm>
+            <a:off x="192012" y="-23007"/>
+            <a:ext cx="1152150" cy="215444"/>
+          </a:xfrm>
+          <a:prstGeom prst="rect">
+            <a:avLst/>
+          </a:prstGeom>
+          <a:noFill/>
+        </p:spPr>
+        <p:txBody>
+          <a:bodyPr wrap="square" rtlCol="0">
+            <a:spAutoFit/>
+          </a:bodyPr>
+          <a:lstStyle/>
+          <a:p>
+            <a:r>
+              <a:rPr lang="en-US" sz="800" dirty="0" smtClean="0">
+                <a:latin typeface="Times New Roman" pitchFamily="18" charset="0"/>
+                <a:cs typeface="Times New Roman" pitchFamily="18" charset="0"/>
+              </a:rPr>
+              <a:t>Main Core (Assembly)</a:t>
+            </a:r>
+            <a:endParaRPr lang="en-US" sz="800" dirty="0">
+              <a:latin typeface="Times New Roman" pitchFamily="18" charset="0"/>
+              <a:cs typeface="Times New Roman" pitchFamily="18" charset="0"/>
+            </a:endParaRPr>
+          </a:p>
+        </p:txBody>
+      </p:sp>
+      <p:sp>
+        <p:nvSpPr>
+          <p:cNvPr id="7" name="TextBox 6"/>
+          <p:cNvSpPr txBox="1"/>
+          <p:nvPr/>
+        </p:nvSpPr>
+        <p:spPr>
+          <a:xfrm>
+            <a:off x="1781675" y="-23007"/>
+            <a:ext cx="976117" cy="215444"/>
+          </a:xfrm>
+          <a:prstGeom prst="rect">
+            <a:avLst/>
+          </a:prstGeom>
+          <a:noFill/>
+        </p:spPr>
+        <p:txBody>
+          <a:bodyPr wrap="square" rtlCol="0">
+            <a:spAutoFit/>
+          </a:bodyPr>
+          <a:lstStyle/>
+          <a:p>
+            <a:pPr algn="ctr"/>
+            <a:r>
+              <a:rPr lang="en-US" sz="800" dirty="0" smtClean="0">
+                <a:latin typeface="Times New Roman" pitchFamily="18" charset="0"/>
+                <a:cs typeface="Times New Roman" pitchFamily="18" charset="0"/>
+              </a:rPr>
+              <a:t>Null Filtering</a:t>
+            </a:r>
+            <a:endParaRPr lang="en-US" sz="800" dirty="0">
+              <a:latin typeface="Times New Roman" pitchFamily="18" charset="0"/>
+              <a:cs typeface="Times New Roman" pitchFamily="18" charset="0"/>
+            </a:endParaRPr>
+          </a:p>
+        </p:txBody>
+      </p:sp>
+      <p:sp>
+        <p:nvSpPr>
+          <p:cNvPr id="9" name="TextBox 8"/>
+          <p:cNvSpPr txBox="1"/>
+          <p:nvPr/>
+        </p:nvSpPr>
+        <p:spPr>
+          <a:xfrm>
+            <a:off x="1351867" y="164543"/>
+            <a:ext cx="1835735" cy="1661993"/>
+          </a:xfrm>
+          <a:prstGeom prst="rect">
+            <a:avLst/>
+          </a:prstGeom>
+          <a:noFill/>
+        </p:spPr>
+        <p:txBody>
+          <a:bodyPr wrap="square" rtlCol="0">
+            <a:spAutoFit/>
+          </a:bodyPr>
+          <a:lstStyle/>
+          <a:p>
+            <a:r>
+              <a:rPr lang="en-US" sz="600" dirty="0" smtClean="0">
+                <a:latin typeface="Consolas" pitchFamily="49" charset="0"/>
+                <a:cs typeface="Consolas" pitchFamily="49" charset="0"/>
+              </a:rPr>
+              <a:t>1: </a:t>
+            </a:r>
+            <a:r>
+              <a:rPr lang="en-US" sz="600" dirty="0" err="1" smtClean="0">
+                <a:latin typeface="Consolas" pitchFamily="49" charset="0"/>
+                <a:cs typeface="Consolas" pitchFamily="49" charset="0"/>
+              </a:rPr>
+              <a:t>rf_null</a:t>
+            </a:r>
+            <a:r>
+              <a:rPr lang="en-US" sz="600" dirty="0" smtClean="0">
+                <a:latin typeface="Consolas" pitchFamily="49" charset="0"/>
+                <a:cs typeface="Consolas" pitchFamily="49" charset="0"/>
+              </a:rPr>
+              <a:t>[1] = </a:t>
+            </a:r>
+            <a:r>
+              <a:rPr lang="en-US" sz="600" dirty="0" smtClean="0">
+                <a:latin typeface="Consolas" pitchFamily="49" charset="0"/>
+                <a:cs typeface="Consolas" pitchFamily="49" charset="0"/>
+              </a:rPr>
+              <a:t>false</a:t>
+            </a:r>
+            <a:endParaRPr lang="en-US" sz="600" dirty="0">
+              <a:latin typeface="Consolas" pitchFamily="49" charset="0"/>
+              <a:cs typeface="Consolas" pitchFamily="49" charset="0"/>
+            </a:endParaRPr>
+          </a:p>
+          <a:p>
+            <a:endParaRPr lang="en-US" sz="600" dirty="0" smtClean="0">
+              <a:latin typeface="Consolas" pitchFamily="49" charset="0"/>
+              <a:cs typeface="Consolas" pitchFamily="49" charset="0"/>
+            </a:endParaRPr>
+          </a:p>
+          <a:p>
+            <a:endParaRPr lang="en-US" sz="600" dirty="0" smtClean="0">
+              <a:latin typeface="Consolas" pitchFamily="49" charset="0"/>
+              <a:cs typeface="Consolas" pitchFamily="49" charset="0"/>
+            </a:endParaRPr>
+          </a:p>
+          <a:p>
+            <a:r>
+              <a:rPr lang="en-US" sz="600" dirty="0" smtClean="0">
+                <a:latin typeface="Consolas" pitchFamily="49" charset="0"/>
+                <a:cs typeface="Consolas" pitchFamily="49" charset="0"/>
+              </a:rPr>
+              <a:t>2</a:t>
+            </a:r>
+            <a:r>
+              <a:rPr lang="en-US" sz="600" dirty="0" smtClean="0">
+                <a:latin typeface="Consolas" pitchFamily="49" charset="0"/>
+                <a:cs typeface="Consolas" pitchFamily="49" charset="0"/>
+              </a:rPr>
+              <a:t>: </a:t>
+            </a:r>
+            <a:r>
+              <a:rPr lang="en-US" sz="600" dirty="0" err="1" smtClean="0">
+                <a:latin typeface="Consolas" pitchFamily="49" charset="0"/>
+                <a:cs typeface="Consolas" pitchFamily="49" charset="0"/>
+              </a:rPr>
+              <a:t>rf_null</a:t>
+            </a:r>
+            <a:r>
+              <a:rPr lang="en-US" sz="600" dirty="0" smtClean="0">
+                <a:latin typeface="Consolas" pitchFamily="49" charset="0"/>
+                <a:cs typeface="Consolas" pitchFamily="49" charset="0"/>
+              </a:rPr>
+              <a:t>[2] = true</a:t>
+            </a:r>
+            <a:endParaRPr lang="en-US" sz="600" dirty="0" smtClean="0">
+              <a:latin typeface="Consolas" pitchFamily="49" charset="0"/>
+              <a:cs typeface="Consolas" pitchFamily="49" charset="0"/>
+            </a:endParaRPr>
+          </a:p>
+          <a:p>
+            <a:endParaRPr lang="en-US" sz="600" dirty="0">
+              <a:latin typeface="Consolas" pitchFamily="49" charset="0"/>
+              <a:cs typeface="Consolas" pitchFamily="49" charset="0"/>
+            </a:endParaRPr>
+          </a:p>
+          <a:p>
+            <a:endParaRPr lang="en-US" sz="600" dirty="0" smtClean="0">
+              <a:latin typeface="Consolas" pitchFamily="49" charset="0"/>
+              <a:cs typeface="Consolas" pitchFamily="49" charset="0"/>
+            </a:endParaRPr>
+          </a:p>
+          <a:p>
+            <a:r>
+              <a:rPr lang="en-US" sz="600" dirty="0" smtClean="0">
+                <a:latin typeface="Consolas" pitchFamily="49" charset="0"/>
+                <a:cs typeface="Consolas" pitchFamily="49" charset="0"/>
+              </a:rPr>
+              <a:t>3</a:t>
+            </a:r>
+            <a:r>
+              <a:rPr lang="en-US" sz="600" dirty="0" smtClean="0">
+                <a:latin typeface="Consolas" pitchFamily="49" charset="0"/>
+                <a:cs typeface="Consolas" pitchFamily="49" charset="0"/>
+              </a:rPr>
+              <a:t>: </a:t>
+            </a:r>
+            <a:r>
+              <a:rPr lang="en-US" sz="600" dirty="0" err="1" smtClean="0">
+                <a:latin typeface="Consolas" pitchFamily="49" charset="0"/>
+                <a:cs typeface="Consolas" pitchFamily="49" charset="0"/>
+              </a:rPr>
+              <a:t>rf_null</a:t>
+            </a:r>
+            <a:r>
+              <a:rPr lang="en-US" sz="600" dirty="0" smtClean="0">
+                <a:latin typeface="Consolas" pitchFamily="49" charset="0"/>
+                <a:cs typeface="Consolas" pitchFamily="49" charset="0"/>
+              </a:rPr>
+              <a:t>[3] = true</a:t>
+            </a:r>
+          </a:p>
+          <a:p>
+            <a:endParaRPr lang="en-US" sz="600" dirty="0">
+              <a:latin typeface="Consolas" pitchFamily="49" charset="0"/>
+              <a:cs typeface="Consolas" pitchFamily="49" charset="0"/>
+            </a:endParaRPr>
+          </a:p>
+          <a:p>
+            <a:r>
+              <a:rPr lang="en-US" sz="600" dirty="0" smtClean="0">
+                <a:latin typeface="Consolas" pitchFamily="49" charset="0"/>
+                <a:cs typeface="Consolas" pitchFamily="49" charset="0"/>
+              </a:rPr>
+              <a:t>3b</a:t>
+            </a:r>
+            <a:r>
+              <a:rPr lang="en-US" sz="600" dirty="0" smtClean="0">
+                <a:latin typeface="Consolas" pitchFamily="49" charset="0"/>
+                <a:cs typeface="Consolas" pitchFamily="49" charset="0"/>
+              </a:rPr>
+              <a:t>: </a:t>
+            </a:r>
+            <a:r>
+              <a:rPr lang="en-US" sz="600" dirty="0" smtClean="0">
+                <a:latin typeface="Consolas" pitchFamily="49" charset="0"/>
+                <a:cs typeface="Consolas" pitchFamily="49" charset="0"/>
+              </a:rPr>
+              <a:t>if (</a:t>
+            </a:r>
+            <a:r>
+              <a:rPr lang="en-US" sz="600" dirty="0" err="1" smtClean="0">
+                <a:latin typeface="Consolas" pitchFamily="49" charset="0"/>
+                <a:cs typeface="Consolas" pitchFamily="49" charset="0"/>
+              </a:rPr>
+              <a:t>rf_null</a:t>
+            </a:r>
+            <a:r>
+              <a:rPr lang="en-US" sz="600" dirty="0" smtClean="0">
+                <a:latin typeface="Consolas" pitchFamily="49" charset="0"/>
+                <a:cs typeface="Consolas" pitchFamily="49" charset="0"/>
+              </a:rPr>
+              <a:t>[1] &amp;&amp; </a:t>
+            </a:r>
+            <a:r>
+              <a:rPr lang="en-US" sz="600" dirty="0" err="1" smtClean="0">
+                <a:latin typeface="Consolas" pitchFamily="49" charset="0"/>
+                <a:cs typeface="Consolas" pitchFamily="49" charset="0"/>
+              </a:rPr>
+              <a:t>rf_null</a:t>
+            </a:r>
+            <a:r>
+              <a:rPr lang="en-US" sz="600" dirty="0" smtClean="0">
+                <a:latin typeface="Consolas" pitchFamily="49" charset="0"/>
+                <a:cs typeface="Consolas" pitchFamily="49" charset="0"/>
+              </a:rPr>
+              <a:t>[3]) {</a:t>
+            </a:r>
+          </a:p>
+          <a:p>
+            <a:r>
+              <a:rPr lang="en-US" sz="600" dirty="0">
+                <a:latin typeface="Consolas" pitchFamily="49" charset="0"/>
+                <a:cs typeface="Consolas" pitchFamily="49" charset="0"/>
+              </a:rPr>
+              <a:t> </a:t>
+            </a:r>
+            <a:r>
+              <a:rPr lang="en-US" sz="600" dirty="0" smtClean="0">
+                <a:latin typeface="Consolas" pitchFamily="49" charset="0"/>
+                <a:cs typeface="Consolas" pitchFamily="49" charset="0"/>
+              </a:rPr>
+              <a:t>    </a:t>
+            </a:r>
+            <a:r>
+              <a:rPr lang="en-US" sz="600" dirty="0" smtClean="0">
+                <a:latin typeface="Consolas" pitchFamily="49" charset="0"/>
+                <a:cs typeface="Consolas" pitchFamily="49" charset="0"/>
+              </a:rPr>
+              <a:t> // </a:t>
+            </a:r>
+            <a:r>
+              <a:rPr lang="en-US" sz="600" dirty="0" smtClean="0">
+                <a:latin typeface="Consolas" pitchFamily="49" charset="0"/>
+                <a:cs typeface="Consolas" pitchFamily="49" charset="0"/>
+              </a:rPr>
+              <a:t>drop monitoring</a:t>
+            </a:r>
+          </a:p>
+          <a:p>
+            <a:r>
+              <a:rPr lang="en-US" sz="600" dirty="0">
+                <a:latin typeface="Consolas" pitchFamily="49" charset="0"/>
+                <a:cs typeface="Consolas" pitchFamily="49" charset="0"/>
+              </a:rPr>
+              <a:t> </a:t>
+            </a:r>
+            <a:r>
+              <a:rPr lang="en-US" sz="600" dirty="0" smtClean="0">
+                <a:latin typeface="Consolas" pitchFamily="49" charset="0"/>
+                <a:cs typeface="Consolas" pitchFamily="49" charset="0"/>
+              </a:rPr>
+              <a:t>  </a:t>
+            </a:r>
+            <a:r>
+              <a:rPr lang="en-US" sz="600" dirty="0" smtClean="0">
+                <a:latin typeface="Consolas" pitchFamily="49" charset="0"/>
+                <a:cs typeface="Consolas" pitchFamily="49" charset="0"/>
+              </a:rPr>
+              <a:t> }</a:t>
+            </a:r>
+          </a:p>
+          <a:p>
+            <a:r>
+              <a:rPr lang="en-US" sz="600" dirty="0" smtClean="0">
+                <a:latin typeface="Consolas" pitchFamily="49" charset="0"/>
+                <a:cs typeface="Consolas" pitchFamily="49" charset="0"/>
+              </a:rPr>
+              <a:t>    </a:t>
+            </a:r>
+            <a:r>
+              <a:rPr lang="en-US" sz="600" dirty="0" err="1" smtClean="0">
+                <a:latin typeface="Consolas" pitchFamily="49" charset="0"/>
+                <a:cs typeface="Consolas" pitchFamily="49" charset="0"/>
+              </a:rPr>
+              <a:t>mem_null</a:t>
+            </a:r>
+            <a:r>
+              <a:rPr lang="en-US" sz="600" dirty="0" smtClean="0">
+                <a:latin typeface="Consolas" pitchFamily="49" charset="0"/>
+                <a:cs typeface="Consolas" pitchFamily="49" charset="0"/>
+              </a:rPr>
+              <a:t>[r3 + 12] = </a:t>
+            </a:r>
+            <a:r>
+              <a:rPr lang="en-US" sz="600" dirty="0" err="1" smtClean="0">
+                <a:latin typeface="Consolas" pitchFamily="49" charset="0"/>
+                <a:cs typeface="Consolas" pitchFamily="49" charset="0"/>
+              </a:rPr>
+              <a:t>rf_null</a:t>
+            </a:r>
+            <a:r>
+              <a:rPr lang="en-US" sz="600" dirty="0" smtClean="0">
+                <a:latin typeface="Consolas" pitchFamily="49" charset="0"/>
+                <a:cs typeface="Consolas" pitchFamily="49" charset="0"/>
+              </a:rPr>
+              <a:t>[r3]</a:t>
+            </a:r>
+            <a:endParaRPr lang="en-US" sz="600" dirty="0" smtClean="0">
+              <a:latin typeface="Consolas" pitchFamily="49" charset="0"/>
+              <a:cs typeface="Consolas" pitchFamily="49" charset="0"/>
+            </a:endParaRPr>
+          </a:p>
+          <a:p>
+            <a:endParaRPr lang="en-US" sz="600" dirty="0" smtClean="0">
+              <a:latin typeface="Consolas" pitchFamily="49" charset="0"/>
+              <a:cs typeface="Consolas" pitchFamily="49" charset="0"/>
+            </a:endParaRPr>
+          </a:p>
+          <a:p>
+            <a:r>
+              <a:rPr lang="en-US" sz="600" dirty="0">
+                <a:latin typeface="Consolas" pitchFamily="49" charset="0"/>
+                <a:cs typeface="Consolas" pitchFamily="49" charset="0"/>
+              </a:rPr>
+              <a:t>4</a:t>
+            </a:r>
+            <a:r>
+              <a:rPr lang="en-US" sz="600" dirty="0" smtClean="0">
+                <a:latin typeface="Consolas" pitchFamily="49" charset="0"/>
+                <a:cs typeface="Consolas" pitchFamily="49" charset="0"/>
+              </a:rPr>
+              <a:t>: </a:t>
+            </a:r>
+            <a:r>
+              <a:rPr lang="en-US" sz="600" dirty="0" smtClean="0">
+                <a:latin typeface="Consolas" pitchFamily="49" charset="0"/>
+                <a:cs typeface="Consolas" pitchFamily="49" charset="0"/>
+              </a:rPr>
+              <a:t>if (</a:t>
+            </a:r>
+            <a:r>
+              <a:rPr lang="en-US" sz="600" dirty="0" err="1" smtClean="0">
+                <a:latin typeface="Consolas" pitchFamily="49" charset="0"/>
+                <a:cs typeface="Consolas" pitchFamily="49" charset="0"/>
+              </a:rPr>
+              <a:t>rf_null</a:t>
+            </a:r>
+            <a:r>
+              <a:rPr lang="en-US" sz="600" dirty="0" smtClean="0">
+                <a:latin typeface="Consolas" pitchFamily="49" charset="0"/>
+                <a:cs typeface="Consolas" pitchFamily="49" charset="0"/>
+              </a:rPr>
+              <a:t>[2] &amp;&amp; </a:t>
+            </a:r>
+            <a:r>
+              <a:rPr lang="en-US" sz="600" dirty="0" err="1" smtClean="0">
+                <a:latin typeface="Consolas" pitchFamily="49" charset="0"/>
+                <a:cs typeface="Consolas" pitchFamily="49" charset="0"/>
+              </a:rPr>
+              <a:t>rf_null</a:t>
+            </a:r>
+            <a:r>
+              <a:rPr lang="en-US" sz="600" dirty="0" smtClean="0">
+                <a:latin typeface="Consolas" pitchFamily="49" charset="0"/>
+                <a:cs typeface="Consolas" pitchFamily="49" charset="0"/>
+              </a:rPr>
+              <a:t>[3]) {</a:t>
+            </a:r>
+          </a:p>
+          <a:p>
+            <a:r>
+              <a:rPr lang="en-US" sz="600" dirty="0">
+                <a:latin typeface="Consolas" pitchFamily="49" charset="0"/>
+                <a:cs typeface="Consolas" pitchFamily="49" charset="0"/>
+              </a:rPr>
+              <a:t> </a:t>
+            </a:r>
+            <a:r>
+              <a:rPr lang="en-US" sz="600" dirty="0" smtClean="0">
+                <a:latin typeface="Consolas" pitchFamily="49" charset="0"/>
+                <a:cs typeface="Consolas" pitchFamily="49" charset="0"/>
+              </a:rPr>
+              <a:t>    // drop monitoring</a:t>
+            </a:r>
+          </a:p>
+          <a:p>
+            <a:r>
+              <a:rPr lang="en-US" sz="600" dirty="0">
+                <a:latin typeface="Consolas" pitchFamily="49" charset="0"/>
+                <a:cs typeface="Consolas" pitchFamily="49" charset="0"/>
+              </a:rPr>
+              <a:t> </a:t>
+            </a:r>
+            <a:r>
+              <a:rPr lang="en-US" sz="600" dirty="0" smtClean="0">
+                <a:latin typeface="Consolas" pitchFamily="49" charset="0"/>
+                <a:cs typeface="Consolas" pitchFamily="49" charset="0"/>
+              </a:rPr>
+              <a:t>  }</a:t>
+            </a:r>
+          </a:p>
+          <a:p>
+            <a:r>
+              <a:rPr lang="en-US" sz="600" dirty="0">
+                <a:latin typeface="Consolas" pitchFamily="49" charset="0"/>
+                <a:cs typeface="Consolas" pitchFamily="49" charset="0"/>
+              </a:rPr>
+              <a:t> </a:t>
+            </a:r>
+            <a:r>
+              <a:rPr lang="en-US" sz="600" dirty="0" smtClean="0">
+                <a:latin typeface="Consolas" pitchFamily="49" charset="0"/>
+                <a:cs typeface="Consolas" pitchFamily="49" charset="0"/>
+              </a:rPr>
+              <a:t>  </a:t>
+            </a:r>
+            <a:r>
+              <a:rPr lang="en-US" sz="600" dirty="0" err="1" smtClean="0">
+                <a:latin typeface="Consolas" pitchFamily="49" charset="0"/>
+                <a:cs typeface="Consolas" pitchFamily="49" charset="0"/>
+              </a:rPr>
+              <a:t>rf_null</a:t>
+            </a:r>
+            <a:r>
+              <a:rPr lang="en-US" sz="600" dirty="0" smtClean="0">
+                <a:latin typeface="Consolas" pitchFamily="49" charset="0"/>
+                <a:cs typeface="Consolas" pitchFamily="49" charset="0"/>
+              </a:rPr>
+              <a:t>[r3] = </a:t>
+            </a:r>
+            <a:r>
+              <a:rPr lang="en-US" sz="600" dirty="0" err="1" smtClean="0">
+                <a:latin typeface="Consolas" pitchFamily="49" charset="0"/>
+                <a:cs typeface="Consolas" pitchFamily="49" charset="0"/>
+              </a:rPr>
+              <a:t>rf_null</a:t>
+            </a:r>
+            <a:r>
+              <a:rPr lang="en-US" sz="600" dirty="0" smtClean="0">
+                <a:latin typeface="Consolas" pitchFamily="49" charset="0"/>
+                <a:cs typeface="Consolas" pitchFamily="49" charset="0"/>
+              </a:rPr>
+              <a:t>[3] &amp; </a:t>
+            </a:r>
+            <a:r>
+              <a:rPr lang="en-US" sz="600" dirty="0" err="1" smtClean="0">
+                <a:latin typeface="Consolas" pitchFamily="49" charset="0"/>
+                <a:cs typeface="Consolas" pitchFamily="49" charset="0"/>
+              </a:rPr>
+              <a:t>rf_null</a:t>
+            </a:r>
+            <a:r>
+              <a:rPr lang="en-US" sz="600" dirty="0" smtClean="0">
+                <a:latin typeface="Consolas" pitchFamily="49" charset="0"/>
+                <a:cs typeface="Consolas" pitchFamily="49" charset="0"/>
+              </a:rPr>
+              <a:t>[2]</a:t>
+            </a:r>
+            <a:endParaRPr lang="en-US" sz="600" dirty="0">
+              <a:latin typeface="Consolas" pitchFamily="49" charset="0"/>
+              <a:cs typeface="Consolas" pitchFamily="49" charset="0"/>
+            </a:endParaRPr>
+          </a:p>
+        </p:txBody>
+      </p:sp>
+      <p:cxnSp>
+        <p:nvCxnSpPr>
+          <p:cNvPr id="10" name="Straight Connector 9"/>
+          <p:cNvCxnSpPr/>
+          <p:nvPr/>
+        </p:nvCxnSpPr>
+        <p:spPr>
+          <a:xfrm>
+            <a:off x="25594" y="429750"/>
+            <a:ext cx="3162008" cy="0"/>
+          </a:xfrm>
+          <a:prstGeom prst="line">
+            <a:avLst/>
+          </a:prstGeom>
+          <a:ln>
+            <a:solidFill>
+              <a:schemeClr val="bg1">
+                <a:lumMod val="75000"/>
+              </a:schemeClr>
+            </a:solidFill>
+            <a:prstDash val="solid"/>
+          </a:ln>
+        </p:spPr>
+        <p:style>
+          <a:lnRef idx="1">
+            <a:schemeClr val="accent1"/>
+          </a:lnRef>
+          <a:fillRef idx="0">
+            <a:schemeClr val="accent1"/>
+          </a:fillRef>
+          <a:effectRef idx="0">
+            <a:schemeClr val="accent1"/>
+          </a:effectRef>
+          <a:fontRef idx="minor">
+            <a:schemeClr val="tx1"/>
+          </a:fontRef>
+        </p:style>
+      </p:cxnSp>
+      <p:cxnSp>
+        <p:nvCxnSpPr>
+          <p:cNvPr id="11" name="Straight Connector 10"/>
+          <p:cNvCxnSpPr/>
+          <p:nvPr/>
+        </p:nvCxnSpPr>
+        <p:spPr>
+          <a:xfrm>
+            <a:off x="31994" y="736990"/>
+            <a:ext cx="3162006" cy="0"/>
+          </a:xfrm>
+          <a:prstGeom prst="line">
+            <a:avLst/>
+          </a:prstGeom>
+          <a:ln>
+            <a:solidFill>
+              <a:schemeClr val="bg1">
+                <a:lumMod val="75000"/>
+              </a:schemeClr>
+            </a:solidFill>
+            <a:prstDash val="solid"/>
+          </a:ln>
+        </p:spPr>
+        <p:style>
+          <a:lnRef idx="1">
+            <a:schemeClr val="accent1"/>
+          </a:lnRef>
+          <a:fillRef idx="0">
+            <a:schemeClr val="accent1"/>
+          </a:fillRef>
+          <a:effectRef idx="0">
+            <a:schemeClr val="accent1"/>
+          </a:effectRef>
+          <a:fontRef idx="minor">
+            <a:schemeClr val="tx1"/>
+          </a:fontRef>
+        </p:style>
+      </p:cxnSp>
+      <p:cxnSp>
+        <p:nvCxnSpPr>
+          <p:cNvPr id="12" name="Straight Connector 11"/>
+          <p:cNvCxnSpPr/>
+          <p:nvPr/>
+        </p:nvCxnSpPr>
+        <p:spPr>
+          <a:xfrm>
+            <a:off x="38393" y="1351470"/>
+            <a:ext cx="3162007" cy="0"/>
+          </a:xfrm>
+          <a:prstGeom prst="line">
+            <a:avLst/>
+          </a:prstGeom>
+          <a:ln>
+            <a:solidFill>
+              <a:schemeClr val="bg1">
+                <a:lumMod val="75000"/>
+              </a:schemeClr>
+            </a:solidFill>
+            <a:prstDash val="solid"/>
+          </a:ln>
+        </p:spPr>
+        <p:style>
+          <a:lnRef idx="1">
+            <a:schemeClr val="accent1"/>
+          </a:lnRef>
+          <a:fillRef idx="0">
+            <a:schemeClr val="accent1"/>
+          </a:fillRef>
+          <a:effectRef idx="0">
+            <a:schemeClr val="accent1"/>
+          </a:effectRef>
+          <a:fontRef idx="minor">
+            <a:schemeClr val="tx1"/>
+          </a:fontRef>
+        </p:style>
+      </p:cxnSp>
+      <p:cxnSp>
+        <p:nvCxnSpPr>
+          <p:cNvPr id="13" name="Straight Connector 12"/>
+          <p:cNvCxnSpPr/>
+          <p:nvPr/>
+        </p:nvCxnSpPr>
+        <p:spPr>
+          <a:xfrm>
+            <a:off x="41409" y="890610"/>
+            <a:ext cx="3149209" cy="342"/>
+          </a:xfrm>
+          <a:prstGeom prst="line">
+            <a:avLst/>
+          </a:prstGeom>
+          <a:ln>
+            <a:solidFill>
+              <a:schemeClr val="bg1">
+                <a:lumMod val="75000"/>
+              </a:schemeClr>
+            </a:solidFill>
+            <a:prstDash val="solid"/>
+          </a:ln>
+        </p:spPr>
+        <p:style>
+          <a:lnRef idx="1">
+            <a:schemeClr val="accent1"/>
+          </a:lnRef>
+          <a:fillRef idx="0">
+            <a:schemeClr val="accent1"/>
+          </a:fillRef>
+          <a:effectRef idx="0">
+            <a:schemeClr val="accent1"/>
+          </a:effectRef>
+          <a:fontRef idx="minor">
+            <a:schemeClr val="tx1"/>
+          </a:fontRef>
+        </p:style>
+      </p:cxnSp>
+      <p:cxnSp>
+        <p:nvCxnSpPr>
+          <p:cNvPr id="14" name="Straight Connector 13"/>
+          <p:cNvCxnSpPr/>
+          <p:nvPr/>
+        </p:nvCxnSpPr>
+        <p:spPr>
+          <a:xfrm>
+            <a:off x="1351867" y="164541"/>
+            <a:ext cx="0" cy="1609384"/>
+          </a:xfrm>
+          <a:prstGeom prst="line">
+            <a:avLst/>
+          </a:prstGeom>
+          <a:ln>
+            <a:solidFill>
+              <a:schemeClr val="tx1"/>
+            </a:solidFill>
+          </a:ln>
+        </p:spPr>
+        <p:style>
+          <a:lnRef idx="1">
+            <a:schemeClr val="accent1"/>
+          </a:lnRef>
+          <a:fillRef idx="0">
+            <a:schemeClr val="accent1"/>
+          </a:fillRef>
+          <a:effectRef idx="0">
+            <a:schemeClr val="accent1"/>
+          </a:effectRef>
+          <a:fontRef idx="minor">
+            <a:schemeClr val="tx1"/>
+          </a:fontRef>
+        </p:style>
+      </p:cxnSp>
+      <p:sp>
+        <p:nvSpPr>
+          <p:cNvPr id="16" name="Rectangle 15"/>
+          <p:cNvSpPr/>
+          <p:nvPr/>
+        </p:nvSpPr>
+        <p:spPr>
+          <a:xfrm>
+            <a:off x="25596" y="164546"/>
+            <a:ext cx="3162006" cy="1609379"/>
+          </a:xfrm>
+          <a:prstGeom prst="rect">
+            <a:avLst/>
+          </a:prstGeom>
+          <a:noFill/>
+          <a:ln w="12700">
+            <a:solidFill>
+              <a:schemeClr val="tx1"/>
+            </a:solidFill>
+          </a:ln>
+        </p:spPr>
+        <p:style>
+          <a:lnRef idx="2">
+            <a:schemeClr val="accent1">
+              <a:shade val="50000"/>
+            </a:schemeClr>
+          </a:lnRef>
+          <a:fillRef idx="1">
+            <a:schemeClr val="accent1"/>
+          </a:fillRef>
+          <a:effectRef idx="0">
+            <a:schemeClr val="accent1"/>
+          </a:effectRef>
+          <a:fontRef idx="minor">
+            <a:schemeClr val="lt1"/>
+          </a:fontRef>
+        </p:style>
+        <p:txBody>
+          <a:bodyPr rtlCol="0" anchor="ctr"/>
+          <a:lstStyle/>
+          <a:p>
+            <a:endParaRPr lang="en-US" sz="900" dirty="0">
+              <a:solidFill>
+                <a:schemeClr val="tx1"/>
+              </a:solidFill>
+              <a:latin typeface="Consolas" pitchFamily="49" charset="0"/>
+              <a:cs typeface="Consolas" pitchFamily="49" charset="0"/>
+            </a:endParaRPr>
+          </a:p>
+        </p:txBody>
+      </p:sp>
+    </p:spTree>
+    <p:extLst>
+      <p:ext uri="{BB962C8B-B14F-4D97-AF65-F5344CB8AC3E}">
+        <p14:creationId xmlns:p14="http://schemas.microsoft.com/office/powerpoint/2010/main" val="2657819292"/>
       </p:ext>
     </p:extLst>
   </p:cSld>

</xml_diff>

<commit_message>
Edits to Section 3 based on Ed's comments.
</commit_message>
<xml_diff>
--- a/figs_src/diagrams.pptx
+++ b/figs_src/diagrams.pptx
@@ -172,7 +172,7 @@
           </a:prstGeom>
         </p:spPr>
         <p:txBody>
-          <a:bodyPr vert="horz" lIns="54261" tIns="27131" rIns="54261" bIns="27131" rtlCol="0"/>
+          <a:bodyPr vert="horz" lIns="54252" tIns="27126" rIns="54252" bIns="27126" rtlCol="0"/>
           <a:lstStyle>
             <a:lvl1pPr algn="l">
               <a:defRPr sz="700"/>
@@ -203,7 +203,7 @@
           </a:prstGeom>
         </p:spPr>
         <p:txBody>
-          <a:bodyPr vert="horz" lIns="54261" tIns="27131" rIns="54261" bIns="27131" rtlCol="0"/>
+          <a:bodyPr vert="horz" lIns="54252" tIns="27126" rIns="54252" bIns="27126" rtlCol="0"/>
           <a:lstStyle>
             <a:lvl1pPr algn="r">
               <a:defRPr sz="700"/>
@@ -244,7 +244,7 @@
           </a:ln>
         </p:spPr>
         <p:txBody>
-          <a:bodyPr vert="horz" lIns="54261" tIns="27131" rIns="54261" bIns="27131" rtlCol="0" anchor="ctr"/>
+          <a:bodyPr vert="horz" lIns="54252" tIns="27126" rIns="54252" bIns="27126" rtlCol="0" anchor="ctr"/>
           <a:lstStyle/>
           <a:p>
             <a:endParaRPr lang="en-US"/>
@@ -271,7 +271,7 @@
           </a:prstGeom>
         </p:spPr>
         <p:txBody>
-          <a:bodyPr vert="horz" lIns="54261" tIns="27131" rIns="54261" bIns="27131" rtlCol="0"/>
+          <a:bodyPr vert="horz" lIns="54252" tIns="27126" rIns="54252" bIns="27126" rtlCol="0"/>
           <a:lstStyle/>
           <a:p>
             <a:pPr lvl="0"/>
@@ -331,7 +331,7 @@
           </a:prstGeom>
         </p:spPr>
         <p:txBody>
-          <a:bodyPr vert="horz" lIns="54261" tIns="27131" rIns="54261" bIns="27131" rtlCol="0" anchor="b"/>
+          <a:bodyPr vert="horz" lIns="54252" tIns="27126" rIns="54252" bIns="27126" rtlCol="0" anchor="b"/>
           <a:lstStyle>
             <a:lvl1pPr algn="l">
               <a:defRPr sz="700"/>
@@ -362,7 +362,7 @@
           </a:prstGeom>
         </p:spPr>
         <p:txBody>
-          <a:bodyPr vert="horz" lIns="54261" tIns="27131" rIns="54261" bIns="27131" rtlCol="0" anchor="b"/>
+          <a:bodyPr vert="horz" lIns="54252" tIns="27126" rIns="54252" bIns="27126" rtlCol="0" anchor="b"/>
           <a:lstStyle>
             <a:lvl1pPr algn="r">
               <a:defRPr sz="700"/>
@@ -11765,7 +11765,7 @@
                 <a:latin typeface="Times New Roman" pitchFamily="18" charset="0"/>
                 <a:cs typeface="Times New Roman" pitchFamily="18" charset="0"/>
               </a:rPr>
-              <a:t>Monitoring Core</a:t>
+              <a:t>Monitor</a:t>
             </a:r>
           </a:p>
         </p:txBody>
@@ -11822,20 +11822,7 @@
                 <a:latin typeface="Times New Roman" pitchFamily="18" charset="0"/>
                 <a:cs typeface="Times New Roman" pitchFamily="18" charset="0"/>
               </a:rPr>
-              <a:t>Main</a:t>
-            </a:r>
-          </a:p>
-          <a:p>
-            <a:pPr algn="ctr"/>
-            <a:r>
-              <a:rPr lang="en-US" sz="900" dirty="0" smtClean="0">
-                <a:solidFill>
-                  <a:schemeClr val="tx1"/>
-                </a:solidFill>
-                <a:latin typeface="Times New Roman" pitchFamily="18" charset="0"/>
-                <a:cs typeface="Times New Roman" pitchFamily="18" charset="0"/>
-              </a:rPr>
-              <a:t>Core</a:t>
+              <a:t>Main Core</a:t>
             </a:r>
           </a:p>
         </p:txBody>
@@ -11954,6 +11941,127 @@
               <a:t>monitoring event</a:t>
             </a:r>
             <a:endParaRPr lang="en-US" sz="900" dirty="0">
+              <a:solidFill>
+                <a:schemeClr val="tx1"/>
+              </a:solidFill>
+              <a:latin typeface="Times New Roman" pitchFamily="18" charset="0"/>
+              <a:cs typeface="Times New Roman" pitchFamily="18" charset="0"/>
+            </a:endParaRPr>
+          </a:p>
+        </p:txBody>
+      </p:sp>
+      <p:sp>
+        <p:nvSpPr>
+          <p:cNvPr id="17" name="Rectangle 16"/>
+          <p:cNvSpPr/>
+          <p:nvPr/>
+        </p:nvSpPr>
+        <p:spPr>
+          <a:xfrm>
+            <a:off x="140810" y="500223"/>
+            <a:ext cx="729695" cy="177841"/>
+          </a:xfrm>
+          <a:prstGeom prst="rect">
+            <a:avLst/>
+          </a:prstGeom>
+          <a:solidFill>
+            <a:srgbClr val="66CCFF"/>
+          </a:solidFill>
+          <a:ln w="9525">
+            <a:solidFill>
+              <a:schemeClr val="tx1"/>
+            </a:solidFill>
+          </a:ln>
+        </p:spPr>
+        <p:style>
+          <a:lnRef idx="2">
+            <a:schemeClr val="accent1">
+              <a:shade val="50000"/>
+            </a:schemeClr>
+          </a:lnRef>
+          <a:fillRef idx="1">
+            <a:schemeClr val="accent1"/>
+          </a:fillRef>
+          <a:effectRef idx="0">
+            <a:schemeClr val="accent1"/>
+          </a:effectRef>
+          <a:fontRef idx="minor">
+            <a:schemeClr val="lt1"/>
+          </a:fontRef>
+        </p:style>
+        <p:txBody>
+          <a:bodyPr rtlCol="0" anchor="ctr"/>
+          <a:lstStyle/>
+          <a:p>
+            <a:pPr algn="ctr"/>
+            <a:r>
+              <a:rPr lang="en-US" sz="800" dirty="0" smtClean="0">
+                <a:solidFill>
+                  <a:schemeClr val="tx1"/>
+                </a:solidFill>
+                <a:latin typeface="Times New Roman" pitchFamily="18" charset="0"/>
+                <a:cs typeface="Times New Roman" pitchFamily="18" charset="0"/>
+              </a:rPr>
+              <a:t>Register File</a:t>
+            </a:r>
+          </a:p>
+        </p:txBody>
+      </p:sp>
+      <p:sp>
+        <p:nvSpPr>
+          <p:cNvPr id="18" name="Rectangle 17"/>
+          <p:cNvSpPr/>
+          <p:nvPr/>
+        </p:nvSpPr>
+        <p:spPr>
+          <a:xfrm>
+            <a:off x="2445110" y="500223"/>
+            <a:ext cx="729695" cy="177841"/>
+          </a:xfrm>
+          <a:prstGeom prst="rect">
+            <a:avLst/>
+          </a:prstGeom>
+          <a:solidFill>
+            <a:srgbClr val="66CCFF"/>
+          </a:solidFill>
+          <a:ln w="9525">
+            <a:solidFill>
+              <a:schemeClr val="tx1"/>
+            </a:solidFill>
+          </a:ln>
+        </p:spPr>
+        <p:style>
+          <a:lnRef idx="2">
+            <a:schemeClr val="accent1">
+              <a:shade val="50000"/>
+            </a:schemeClr>
+          </a:lnRef>
+          <a:fillRef idx="1">
+            <a:schemeClr val="accent1"/>
+          </a:fillRef>
+          <a:effectRef idx="0">
+            <a:schemeClr val="accent1"/>
+          </a:effectRef>
+          <a:fontRef idx="minor">
+            <a:schemeClr val="lt1"/>
+          </a:fontRef>
+        </p:style>
+        <p:txBody>
+          <a:bodyPr rtlCol="0" anchor="ctr"/>
+          <a:lstStyle/>
+          <a:p>
+            <a:pPr algn="ctr"/>
+            <a:r>
+              <a:rPr lang="en-US" sz="800" dirty="0" smtClean="0">
+                <a:solidFill>
+                  <a:schemeClr val="tx1"/>
+                </a:solidFill>
+                <a:latin typeface="Times New Roman" pitchFamily="18" charset="0"/>
+                <a:cs typeface="Times New Roman" pitchFamily="18" charset="0"/>
+              </a:rPr>
+              <a:t>RF Metadata</a:t>
+            </a:r>
+            <a:endParaRPr lang="en-US" sz="800" dirty="0" smtClean="0">
               <a:solidFill>
                 <a:schemeClr val="tx1"/>
               </a:solidFill>
@@ -13159,14 +13267,7 @@
                 <a:latin typeface="Consolas" pitchFamily="49" charset="0"/>
                 <a:cs typeface="Consolas" pitchFamily="49" charset="0"/>
               </a:rPr>
-              <a:t>[1] = </a:t>
-            </a:r>
-            <a:r>
-              <a:rPr lang="en-US" sz="600" dirty="0" smtClean="0">
-                <a:latin typeface="Consolas" pitchFamily="49" charset="0"/>
-                <a:cs typeface="Consolas" pitchFamily="49" charset="0"/>
-              </a:rPr>
-              <a:t>false</a:t>
+              <a:t>[1] = false</a:t>
             </a:r>
             <a:endParaRPr lang="en-US" sz="600" dirty="0">
               <a:latin typeface="Consolas" pitchFamily="49" charset="0"/>
@@ -13191,41 +13292,171 @@
                 <a:latin typeface="Consolas" pitchFamily="49" charset="0"/>
                 <a:cs typeface="Consolas" pitchFamily="49" charset="0"/>
               </a:rPr>
-              <a:t>2</a:t>
+              <a:t>2: </a:t>
+            </a:r>
+            <a:r>
+              <a:rPr lang="en-US" sz="600" dirty="0" err="1" smtClean="0">
+                <a:latin typeface="Consolas" pitchFamily="49" charset="0"/>
+                <a:cs typeface="Consolas" pitchFamily="49" charset="0"/>
+              </a:rPr>
+              <a:t>rf_null</a:t>
             </a:r>
             <a:r>
               <a:rPr lang="en-US" sz="600" dirty="0" smtClean="0">
                 <a:latin typeface="Consolas" pitchFamily="49" charset="0"/>
                 <a:cs typeface="Consolas" pitchFamily="49" charset="0"/>
               </a:rPr>
-              <a:t>: </a:t>
-            </a:r>
-            <a:r>
-              <a:rPr lang="en-US" sz="600" dirty="0" err="1" smtClean="0">
-                <a:latin typeface="Consolas" pitchFamily="49" charset="0"/>
-                <a:cs typeface="Consolas" pitchFamily="49" charset="0"/>
-              </a:rPr>
-              <a:t>rf_null</a:t>
-            </a:r>
-            <a:r>
-              <a:rPr lang="en-US" sz="600" dirty="0" smtClean="0">
-                <a:latin typeface="Consolas" pitchFamily="49" charset="0"/>
-                <a:cs typeface="Consolas" pitchFamily="49" charset="0"/>
-              </a:rPr>
               <a:t>[2] = true</a:t>
             </a:r>
+          </a:p>
+          <a:p>
+            <a:endParaRPr lang="en-US" sz="600" dirty="0">
+              <a:latin typeface="Consolas" pitchFamily="49" charset="0"/>
+              <a:cs typeface="Consolas" pitchFamily="49" charset="0"/>
+            </a:endParaRPr>
+          </a:p>
+          <a:p>
             <a:endParaRPr lang="en-US" sz="600" dirty="0" smtClean="0">
               <a:latin typeface="Consolas" pitchFamily="49" charset="0"/>
               <a:cs typeface="Consolas" pitchFamily="49" charset="0"/>
             </a:endParaRPr>
           </a:p>
           <a:p>
+            <a:r>
+              <a:rPr lang="en-US" sz="600" dirty="0" smtClean="0">
+                <a:latin typeface="Consolas" pitchFamily="49" charset="0"/>
+                <a:cs typeface="Consolas" pitchFamily="49" charset="0"/>
+              </a:rPr>
+              <a:t>3: </a:t>
+            </a:r>
+            <a:r>
+              <a:rPr lang="en-US" sz="600" dirty="0" err="1" smtClean="0">
+                <a:latin typeface="Consolas" pitchFamily="49" charset="0"/>
+                <a:cs typeface="Consolas" pitchFamily="49" charset="0"/>
+              </a:rPr>
+              <a:t>rf_null</a:t>
+            </a:r>
+            <a:r>
+              <a:rPr lang="en-US" sz="600" dirty="0" smtClean="0">
+                <a:latin typeface="Consolas" pitchFamily="49" charset="0"/>
+                <a:cs typeface="Consolas" pitchFamily="49" charset="0"/>
+              </a:rPr>
+              <a:t>[3] = true</a:t>
+            </a:r>
+          </a:p>
+          <a:p>
             <a:endParaRPr lang="en-US" sz="600" dirty="0">
               <a:latin typeface="Consolas" pitchFamily="49" charset="0"/>
               <a:cs typeface="Consolas" pitchFamily="49" charset="0"/>
             </a:endParaRPr>
           </a:p>
           <a:p>
+            <a:r>
+              <a:rPr lang="en-US" sz="600" dirty="0" smtClean="0">
+                <a:latin typeface="Consolas" pitchFamily="49" charset="0"/>
+                <a:cs typeface="Consolas" pitchFamily="49" charset="0"/>
+              </a:rPr>
+              <a:t>3b: if (</a:t>
+            </a:r>
+            <a:r>
+              <a:rPr lang="en-US" sz="600" dirty="0" err="1" smtClean="0">
+                <a:latin typeface="Consolas" pitchFamily="49" charset="0"/>
+                <a:cs typeface="Consolas" pitchFamily="49" charset="0"/>
+              </a:rPr>
+              <a:t>rf_null</a:t>
+            </a:r>
+            <a:r>
+              <a:rPr lang="en-US" sz="600" dirty="0" smtClean="0">
+                <a:latin typeface="Consolas" pitchFamily="49" charset="0"/>
+                <a:cs typeface="Consolas" pitchFamily="49" charset="0"/>
+              </a:rPr>
+              <a:t>[1] &amp;&amp; </a:t>
+            </a:r>
+            <a:r>
+              <a:rPr lang="en-US" sz="600" dirty="0" err="1" smtClean="0">
+                <a:latin typeface="Consolas" pitchFamily="49" charset="0"/>
+                <a:cs typeface="Consolas" pitchFamily="49" charset="0"/>
+              </a:rPr>
+              <a:t>rf_null</a:t>
+            </a:r>
+            <a:r>
+              <a:rPr lang="en-US" sz="600" dirty="0" smtClean="0">
+                <a:latin typeface="Consolas" pitchFamily="49" charset="0"/>
+                <a:cs typeface="Consolas" pitchFamily="49" charset="0"/>
+              </a:rPr>
+              <a:t>[3]) {</a:t>
+            </a:r>
+          </a:p>
+          <a:p>
+            <a:r>
+              <a:rPr lang="en-US" sz="600" dirty="0">
+                <a:latin typeface="Consolas" pitchFamily="49" charset="0"/>
+                <a:cs typeface="Consolas" pitchFamily="49" charset="0"/>
+              </a:rPr>
+              <a:t> </a:t>
+            </a:r>
+            <a:r>
+              <a:rPr lang="en-US" sz="600" dirty="0" smtClean="0">
+                <a:latin typeface="Consolas" pitchFamily="49" charset="0"/>
+                <a:cs typeface="Consolas" pitchFamily="49" charset="0"/>
+              </a:rPr>
+              <a:t>     // drop monitoring</a:t>
+            </a:r>
+          </a:p>
+          <a:p>
+            <a:r>
+              <a:rPr lang="en-US" sz="600" dirty="0">
+                <a:latin typeface="Consolas" pitchFamily="49" charset="0"/>
+                <a:cs typeface="Consolas" pitchFamily="49" charset="0"/>
+              </a:rPr>
+              <a:t> </a:t>
+            </a:r>
+            <a:r>
+              <a:rPr lang="en-US" sz="600" dirty="0" smtClean="0">
+                <a:latin typeface="Consolas" pitchFamily="49" charset="0"/>
+                <a:cs typeface="Consolas" pitchFamily="49" charset="0"/>
+              </a:rPr>
+              <a:t>   }</a:t>
+            </a:r>
+          </a:p>
+          <a:p>
+            <a:r>
+              <a:rPr lang="en-US" sz="600" dirty="0" smtClean="0">
+                <a:latin typeface="Consolas" pitchFamily="49" charset="0"/>
+                <a:cs typeface="Consolas" pitchFamily="49" charset="0"/>
+              </a:rPr>
+              <a:t>    </a:t>
+            </a:r>
+            <a:r>
+              <a:rPr lang="en-US" sz="600" dirty="0" err="1" smtClean="0">
+                <a:latin typeface="Consolas" pitchFamily="49" charset="0"/>
+                <a:cs typeface="Consolas" pitchFamily="49" charset="0"/>
+              </a:rPr>
+              <a:t>mem_null</a:t>
+            </a:r>
+            <a:r>
+              <a:rPr lang="en-US" sz="600" dirty="0" smtClean="0">
+                <a:latin typeface="Consolas" pitchFamily="49" charset="0"/>
+                <a:cs typeface="Consolas" pitchFamily="49" charset="0"/>
+              </a:rPr>
+              <a:t>[r3 + 12] = </a:t>
+            </a:r>
+            <a:r>
+              <a:rPr lang="en-US" sz="600" dirty="0" err="1" smtClean="0">
+                <a:latin typeface="Consolas" pitchFamily="49" charset="0"/>
+                <a:cs typeface="Consolas" pitchFamily="49" charset="0"/>
+              </a:rPr>
+              <a:t>rf_null</a:t>
+            </a:r>
+            <a:r>
+              <a:rPr lang="en-US" sz="600" dirty="0" smtClean="0">
+                <a:latin typeface="Consolas" pitchFamily="49" charset="0"/>
+                <a:cs typeface="Consolas" pitchFamily="49" charset="0"/>
+              </a:rPr>
+              <a:t>[r3]</a:t>
+            </a:r>
+          </a:p>
+          <a:p>
             <a:endParaRPr lang="en-US" sz="600" dirty="0" smtClean="0">
               <a:latin typeface="Consolas" pitchFamily="49" charset="0"/>
               <a:cs typeface="Consolas" pitchFamily="49" charset="0"/>
@@ -13233,212 +13464,18 @@
           </a:p>
           <a:p>
             <a:r>
+              <a:rPr lang="en-US" sz="600" dirty="0">
+                <a:latin typeface="Consolas" pitchFamily="49" charset="0"/>
+                <a:cs typeface="Consolas" pitchFamily="49" charset="0"/>
+              </a:rPr>
+              <a:t>4</a:t>
+            </a:r>
+            <a:r>
               <a:rPr lang="en-US" sz="600" dirty="0" smtClean="0">
                 <a:latin typeface="Consolas" pitchFamily="49" charset="0"/>
                 <a:cs typeface="Consolas" pitchFamily="49" charset="0"/>
               </a:rPr>
-              <a:t>3</a:t>
-            </a:r>
-            <a:r>
-              <a:rPr lang="en-US" sz="600" dirty="0" smtClean="0">
-                <a:latin typeface="Consolas" pitchFamily="49" charset="0"/>
-                <a:cs typeface="Consolas" pitchFamily="49" charset="0"/>
-              </a:rPr>
-              <a:t>: </a:t>
-            </a:r>
-            <a:r>
-              <a:rPr lang="en-US" sz="600" dirty="0" err="1" smtClean="0">
-                <a:latin typeface="Consolas" pitchFamily="49" charset="0"/>
-                <a:cs typeface="Consolas" pitchFamily="49" charset="0"/>
-              </a:rPr>
-              <a:t>rf_null</a:t>
-            </a:r>
-            <a:r>
-              <a:rPr lang="en-US" sz="600" dirty="0" smtClean="0">
-                <a:latin typeface="Consolas" pitchFamily="49" charset="0"/>
-                <a:cs typeface="Consolas" pitchFamily="49" charset="0"/>
-              </a:rPr>
-              <a:t>[3] = true</a:t>
-            </a:r>
-          </a:p>
-          <a:p>
-            <a:endParaRPr lang="en-US" sz="600" dirty="0">
-              <a:latin typeface="Consolas" pitchFamily="49" charset="0"/>
-              <a:cs typeface="Consolas" pitchFamily="49" charset="0"/>
-            </a:endParaRPr>
-          </a:p>
-          <a:p>
-            <a:r>
-              <a:rPr lang="en-US" sz="600" dirty="0" smtClean="0">
-                <a:latin typeface="Consolas" pitchFamily="49" charset="0"/>
-                <a:cs typeface="Consolas" pitchFamily="49" charset="0"/>
-              </a:rPr>
-              <a:t>3b</a:t>
-            </a:r>
-            <a:r>
-              <a:rPr lang="en-US" sz="600" dirty="0" smtClean="0">
-                <a:latin typeface="Consolas" pitchFamily="49" charset="0"/>
-                <a:cs typeface="Consolas" pitchFamily="49" charset="0"/>
-              </a:rPr>
-              <a:t>: </a:t>
-            </a:r>
-            <a:r>
-              <a:rPr lang="en-US" sz="600" dirty="0" smtClean="0">
-                <a:latin typeface="Consolas" pitchFamily="49" charset="0"/>
-                <a:cs typeface="Consolas" pitchFamily="49" charset="0"/>
-              </a:rPr>
-              <a:t>if (</a:t>
-            </a:r>
-            <a:r>
-              <a:rPr lang="en-US" sz="600" dirty="0" err="1" smtClean="0">
-                <a:latin typeface="Consolas" pitchFamily="49" charset="0"/>
-                <a:cs typeface="Consolas" pitchFamily="49" charset="0"/>
-              </a:rPr>
-              <a:t>rf_null</a:t>
-            </a:r>
-            <a:r>
-              <a:rPr lang="en-US" sz="600" dirty="0" smtClean="0">
-                <a:latin typeface="Consolas" pitchFamily="49" charset="0"/>
-                <a:cs typeface="Consolas" pitchFamily="49" charset="0"/>
-              </a:rPr>
-              <a:t>[1] &amp;&amp; </a:t>
-            </a:r>
-            <a:r>
-              <a:rPr lang="en-US" sz="600" dirty="0" err="1" smtClean="0">
-                <a:latin typeface="Consolas" pitchFamily="49" charset="0"/>
-                <a:cs typeface="Consolas" pitchFamily="49" charset="0"/>
-              </a:rPr>
-              <a:t>rf_null</a:t>
-            </a:r>
-            <a:r>
-              <a:rPr lang="en-US" sz="600" dirty="0" smtClean="0">
-                <a:latin typeface="Consolas" pitchFamily="49" charset="0"/>
-                <a:cs typeface="Consolas" pitchFamily="49" charset="0"/>
-              </a:rPr>
-              <a:t>[3]) {</a:t>
-            </a:r>
-          </a:p>
-          <a:p>
-            <a:r>
-              <a:rPr lang="en-US" sz="600" dirty="0">
-                <a:latin typeface="Consolas" pitchFamily="49" charset="0"/>
-                <a:cs typeface="Consolas" pitchFamily="49" charset="0"/>
-              </a:rPr>
-              <a:t> </a:t>
-            </a:r>
-            <a:r>
-              <a:rPr lang="en-US" sz="600" dirty="0" smtClean="0">
-                <a:latin typeface="Consolas" pitchFamily="49" charset="0"/>
-                <a:cs typeface="Consolas" pitchFamily="49" charset="0"/>
-              </a:rPr>
-              <a:t>    </a:t>
-            </a:r>
-            <a:r>
-              <a:rPr lang="en-US" sz="600" dirty="0" smtClean="0">
-                <a:latin typeface="Consolas" pitchFamily="49" charset="0"/>
-                <a:cs typeface="Consolas" pitchFamily="49" charset="0"/>
-              </a:rPr>
-              <a:t> // </a:t>
-            </a:r>
-            <a:r>
-              <a:rPr lang="en-US" sz="600" dirty="0" smtClean="0">
-                <a:latin typeface="Consolas" pitchFamily="49" charset="0"/>
-                <a:cs typeface="Consolas" pitchFamily="49" charset="0"/>
-              </a:rPr>
-              <a:t>drop monitoring</a:t>
-            </a:r>
-          </a:p>
-          <a:p>
-            <a:r>
-              <a:rPr lang="en-US" sz="600" dirty="0">
-                <a:latin typeface="Consolas" pitchFamily="49" charset="0"/>
-                <a:cs typeface="Consolas" pitchFamily="49" charset="0"/>
-              </a:rPr>
-              <a:t> </a:t>
-            </a:r>
-            <a:r>
-              <a:rPr lang="en-US" sz="600" dirty="0" smtClean="0">
-                <a:latin typeface="Consolas" pitchFamily="49" charset="0"/>
-                <a:cs typeface="Consolas" pitchFamily="49" charset="0"/>
-              </a:rPr>
-              <a:t>  </a:t>
-            </a:r>
-            <a:r>
-              <a:rPr lang="en-US" sz="600" dirty="0" smtClean="0">
-                <a:latin typeface="Consolas" pitchFamily="49" charset="0"/>
-                <a:cs typeface="Consolas" pitchFamily="49" charset="0"/>
-              </a:rPr>
-              <a:t> }</a:t>
-            </a:r>
-          </a:p>
-          <a:p>
-            <a:r>
-              <a:rPr lang="en-US" sz="600" dirty="0" smtClean="0">
-                <a:latin typeface="Consolas" pitchFamily="49" charset="0"/>
-                <a:cs typeface="Consolas" pitchFamily="49" charset="0"/>
-              </a:rPr>
-              <a:t>    </a:t>
-            </a:r>
-            <a:r>
-              <a:rPr lang="en-US" sz="600" dirty="0" err="1" smtClean="0">
-                <a:latin typeface="Consolas" pitchFamily="49" charset="0"/>
-                <a:cs typeface="Consolas" pitchFamily="49" charset="0"/>
-              </a:rPr>
-              <a:t>mem_null</a:t>
-            </a:r>
-            <a:r>
-              <a:rPr lang="en-US" sz="600" dirty="0" smtClean="0">
-                <a:latin typeface="Consolas" pitchFamily="49" charset="0"/>
-                <a:cs typeface="Consolas" pitchFamily="49" charset="0"/>
-              </a:rPr>
-              <a:t>[r3 + 12] = </a:t>
-            </a:r>
-            <a:r>
-              <a:rPr lang="en-US" sz="600" dirty="0" err="1" smtClean="0">
-                <a:latin typeface="Consolas" pitchFamily="49" charset="0"/>
-                <a:cs typeface="Consolas" pitchFamily="49" charset="0"/>
-              </a:rPr>
-              <a:t>rf_null</a:t>
-            </a:r>
-            <a:r>
-              <a:rPr lang="en-US" sz="600" dirty="0" smtClean="0">
-                <a:latin typeface="Consolas" pitchFamily="49" charset="0"/>
-                <a:cs typeface="Consolas" pitchFamily="49" charset="0"/>
-              </a:rPr>
-              <a:t>[r3]</a:t>
-            </a:r>
-            <a:endParaRPr lang="en-US" sz="600" dirty="0" smtClean="0">
-              <a:latin typeface="Consolas" pitchFamily="49" charset="0"/>
-              <a:cs typeface="Consolas" pitchFamily="49" charset="0"/>
-            </a:endParaRPr>
-          </a:p>
-          <a:p>
-            <a:endParaRPr lang="en-US" sz="600" dirty="0" smtClean="0">
-              <a:latin typeface="Consolas" pitchFamily="49" charset="0"/>
-              <a:cs typeface="Consolas" pitchFamily="49" charset="0"/>
-            </a:endParaRPr>
-          </a:p>
-          <a:p>
-            <a:r>
-              <a:rPr lang="en-US" sz="600" dirty="0">
-                <a:latin typeface="Consolas" pitchFamily="49" charset="0"/>
-                <a:cs typeface="Consolas" pitchFamily="49" charset="0"/>
-              </a:rPr>
-              <a:t>4</a:t>
-            </a:r>
-            <a:r>
-              <a:rPr lang="en-US" sz="600" dirty="0" smtClean="0">
-                <a:latin typeface="Consolas" pitchFamily="49" charset="0"/>
-                <a:cs typeface="Consolas" pitchFamily="49" charset="0"/>
-              </a:rPr>
-              <a:t>: </a:t>
-            </a:r>
-            <a:r>
-              <a:rPr lang="en-US" sz="600" dirty="0" smtClean="0">
-                <a:latin typeface="Consolas" pitchFamily="49" charset="0"/>
-                <a:cs typeface="Consolas" pitchFamily="49" charset="0"/>
-              </a:rPr>
-              <a:t>if (</a:t>
+              <a:t>: if (</a:t>
             </a:r>
             <a:r>
               <a:rPr lang="en-US" sz="600" dirty="0" err="1" smtClean="0">

</xml_diff>

<commit_message>
Update to camera-ready formatting.
</commit_message>
<xml_diff>
--- a/figs_src/diagrams.pptx
+++ b/figs_src/diagrams.pptx
@@ -198,7 +198,7 @@
           <a:p>
             <a:fld id="{843567C3-09B7-4EC5-8695-9659B6A4537F}" type="datetimeFigureOut">
               <a:rPr lang="en-US" smtClean="0"/>
-              <a:t>9/12/2014</a:t>
+              <a:t>12/4/2014</a:t>
             </a:fld>
             <a:endParaRPr lang="en-US"/>
           </a:p>
@@ -648,7 +648,7 @@
             <a:fld id="{1D8BD707-D9CF-40AE-B4C6-C98DA3205C09}" type="datetimeFigureOut">
               <a:rPr lang="en-US" smtClean="0"/>
               <a:pPr/>
-              <a:t>9/12/2014</a:t>
+              <a:t>12/4/2014</a:t>
             </a:fld>
             <a:endParaRPr lang="en-US"/>
           </a:p>
@@ -815,7 +815,7 @@
             <a:fld id="{1D8BD707-D9CF-40AE-B4C6-C98DA3205C09}" type="datetimeFigureOut">
               <a:rPr lang="en-US" smtClean="0"/>
               <a:pPr/>
-              <a:t>9/12/2014</a:t>
+              <a:t>12/4/2014</a:t>
             </a:fld>
             <a:endParaRPr lang="en-US"/>
           </a:p>
@@ -992,7 +992,7 @@
             <a:fld id="{1D8BD707-D9CF-40AE-B4C6-C98DA3205C09}" type="datetimeFigureOut">
               <a:rPr lang="en-US" smtClean="0"/>
               <a:pPr/>
-              <a:t>9/12/2014</a:t>
+              <a:t>12/4/2014</a:t>
             </a:fld>
             <a:endParaRPr lang="en-US"/>
           </a:p>
@@ -1159,7 +1159,7 @@
             <a:fld id="{1D8BD707-D9CF-40AE-B4C6-C98DA3205C09}" type="datetimeFigureOut">
               <a:rPr lang="en-US" smtClean="0"/>
               <a:pPr/>
-              <a:t>9/12/2014</a:t>
+              <a:t>12/4/2014</a:t>
             </a:fld>
             <a:endParaRPr lang="en-US"/>
           </a:p>
@@ -1402,7 +1402,7 @@
             <a:fld id="{1D8BD707-D9CF-40AE-B4C6-C98DA3205C09}" type="datetimeFigureOut">
               <a:rPr lang="en-US" smtClean="0"/>
               <a:pPr/>
-              <a:t>9/12/2014</a:t>
+              <a:t>12/4/2014</a:t>
             </a:fld>
             <a:endParaRPr lang="en-US"/>
           </a:p>
@@ -1687,7 +1687,7 @@
             <a:fld id="{1D8BD707-D9CF-40AE-B4C6-C98DA3205C09}" type="datetimeFigureOut">
               <a:rPr lang="en-US" smtClean="0"/>
               <a:pPr/>
-              <a:t>9/12/2014</a:t>
+              <a:t>12/4/2014</a:t>
             </a:fld>
             <a:endParaRPr lang="en-US"/>
           </a:p>
@@ -2106,7 +2106,7 @@
             <a:fld id="{1D8BD707-D9CF-40AE-B4C6-C98DA3205C09}" type="datetimeFigureOut">
               <a:rPr lang="en-US" smtClean="0"/>
               <a:pPr/>
-              <a:t>9/12/2014</a:t>
+              <a:t>12/4/2014</a:t>
             </a:fld>
             <a:endParaRPr lang="en-US"/>
           </a:p>
@@ -2221,7 +2221,7 @@
             <a:fld id="{1D8BD707-D9CF-40AE-B4C6-C98DA3205C09}" type="datetimeFigureOut">
               <a:rPr lang="en-US" smtClean="0"/>
               <a:pPr/>
-              <a:t>9/12/2014</a:t>
+              <a:t>12/4/2014</a:t>
             </a:fld>
             <a:endParaRPr lang="en-US"/>
           </a:p>
@@ -2313,7 +2313,7 @@
             <a:fld id="{1D8BD707-D9CF-40AE-B4C6-C98DA3205C09}" type="datetimeFigureOut">
               <a:rPr lang="en-US" smtClean="0"/>
               <a:pPr/>
-              <a:t>9/12/2014</a:t>
+              <a:t>12/4/2014</a:t>
             </a:fld>
             <a:endParaRPr lang="en-US"/>
           </a:p>
@@ -2587,7 +2587,7 @@
             <a:fld id="{1D8BD707-D9CF-40AE-B4C6-C98DA3205C09}" type="datetimeFigureOut">
               <a:rPr lang="en-US" smtClean="0"/>
               <a:pPr/>
-              <a:t>9/12/2014</a:t>
+              <a:t>12/4/2014</a:t>
             </a:fld>
             <a:endParaRPr lang="en-US"/>
           </a:p>
@@ -2837,7 +2837,7 @@
             <a:fld id="{1D8BD707-D9CF-40AE-B4C6-C98DA3205C09}" type="datetimeFigureOut">
               <a:rPr lang="en-US" smtClean="0"/>
               <a:pPr/>
-              <a:t>9/12/2014</a:t>
+              <a:t>12/4/2014</a:t>
             </a:fld>
             <a:endParaRPr lang="en-US"/>
           </a:p>
@@ -3047,7 +3047,7 @@
             <a:fld id="{1D8BD707-D9CF-40AE-B4C6-C98DA3205C09}" type="datetimeFigureOut">
               <a:rPr lang="en-US" smtClean="0"/>
               <a:pPr/>
-              <a:t>9/12/2014</a:t>
+              <a:t>12/4/2014</a:t>
             </a:fld>
             <a:endParaRPr lang="en-US"/>
           </a:p>
@@ -4809,6 +4809,13 @@
   <p:clrMapOvr>
     <a:masterClrMapping/>
   </p:clrMapOvr>
+  <p:timing>
+    <p:tnLst>
+      <p:par>
+        <p:cTn id="1" dur="indefinite" restart="never" nodeType="tmRoot"/>
+      </p:par>
+    </p:tnLst>
+  </p:timing>
 </p:sld>
 </file>
 
@@ -5682,7 +5689,7 @@
         <p:spPr>
           <a:xfrm>
             <a:off x="1351867" y="164541"/>
-            <a:ext cx="0" cy="1609384"/>
+            <a:ext cx="0" cy="1661995"/>
           </a:xfrm>
           <a:prstGeom prst="line">
             <a:avLst/>
@@ -5717,7 +5724,7 @@
         <p:spPr>
           <a:xfrm>
             <a:off x="25596" y="164546"/>
-            <a:ext cx="3162006" cy="1609379"/>
+            <a:ext cx="3162006" cy="1661990"/>
           </a:xfrm>
           <a:prstGeom prst="rect">
             <a:avLst/>
@@ -5769,6 +5776,13 @@
   <p:clrMapOvr>
     <a:masterClrMapping/>
   </p:clrMapOvr>
+  <p:timing>
+    <p:tnLst>
+      <p:par>
+        <p:cTn id="1" dur="indefinite" restart="never" nodeType="tmRoot"/>
+      </p:par>
+    </p:tnLst>
+  </p:timing>
 </p:sld>
 </file>
 
@@ -6635,6 +6649,13 @@
   <p:clrMapOvr>
     <a:masterClrMapping/>
   </p:clrMapOvr>
+  <p:timing>
+    <p:tnLst>
+      <p:par>
+        <p:cTn id="1" dur="indefinite" restart="never" nodeType="tmRoot"/>
+      </p:par>
+    </p:tnLst>
+  </p:timing>
 </p:sld>
 </file>
 

</xml_diff>